<commit_message>
Update StudyNotes – .NET Platform Reunification.pptx
</commit_message>
<xml_diff>
--- a/StudyNotes – .NET Platform Reunification.pptx
+++ b/StudyNotes – .NET Platform Reunification.pptx
@@ -8,19 +8,19 @@
     <p:sldId id="256" r:id="rId2"/>
     <p:sldId id="270" r:id="rId3"/>
     <p:sldId id="262" r:id="rId4"/>
-    <p:sldId id="269" r:id="rId5"/>
-    <p:sldId id="264" r:id="rId6"/>
-    <p:sldId id="259" r:id="rId7"/>
-    <p:sldId id="260" r:id="rId8"/>
-    <p:sldId id="273" r:id="rId9"/>
-    <p:sldId id="257" r:id="rId10"/>
-    <p:sldId id="258" r:id="rId11"/>
-    <p:sldId id="272" r:id="rId12"/>
-    <p:sldId id="266" r:id="rId13"/>
-    <p:sldId id="263" r:id="rId14"/>
-    <p:sldId id="265" r:id="rId15"/>
+    <p:sldId id="273" r:id="rId5"/>
+    <p:sldId id="266" r:id="rId6"/>
+    <p:sldId id="257" r:id="rId7"/>
+    <p:sldId id="258" r:id="rId8"/>
+    <p:sldId id="272" r:id="rId9"/>
+    <p:sldId id="271" r:id="rId10"/>
+    <p:sldId id="263" r:id="rId11"/>
+    <p:sldId id="276" r:id="rId12"/>
+    <p:sldId id="274" r:id="rId13"/>
+    <p:sldId id="265" r:id="rId14"/>
+    <p:sldId id="278" r:id="rId15"/>
     <p:sldId id="268" r:id="rId16"/>
-    <p:sldId id="271" r:id="rId17"/>
+    <p:sldId id="277" r:id="rId17"/>
     <p:sldId id="267" r:id="rId18"/>
     <p:sldId id="261" r:id="rId19"/>
   </p:sldIdLst>
@@ -123,7 +123,28 @@
   </p:defaultTextStyle>
   <p:extLst>
     <p:ext uri="{EFAFB233-063F-42B5-8137-9DF3F51BA10A}">
-      <p15:sldGuideLst xmlns:p15="http://schemas.microsoft.com/office/powerpoint/2012/main"/>
+      <p15:sldGuideLst xmlns:p15="http://schemas.microsoft.com/office/powerpoint/2012/main">
+        <p15:guide id="1" orient="horz" pos="2160" userDrawn="1">
+          <p15:clr>
+            <a:srgbClr val="A4A3A4"/>
+          </p15:clr>
+        </p15:guide>
+        <p15:guide id="2" orient="horz" pos="2260" userDrawn="1">
+          <p15:clr>
+            <a:srgbClr val="A4A3A4"/>
+          </p15:clr>
+        </p15:guide>
+        <p15:guide id="3" orient="horz" pos="2360" userDrawn="1">
+          <p15:clr>
+            <a:srgbClr val="A4A3A4"/>
+          </p15:clr>
+        </p15:guide>
+        <p15:guide id="4" pos="3840">
+          <p15:clr>
+            <a:srgbClr val="A4A3A4"/>
+          </p15:clr>
+        </p15:guide>
+      </p15:sldGuideLst>
     </p:ext>
   </p:extLst>
 </p:presentation>
@@ -260,7 +281,7 @@
           <a:p>
             <a:fld id="{6434AF71-F664-4075-BB0C-62CC4F811DAC}" type="datetimeFigureOut">
               <a:rPr lang="en-IN" smtClean="0"/>
-              <a:t>06-06-2020</a:t>
+              <a:t>19-07-2020</a:t>
             </a:fld>
             <a:endParaRPr lang="en-IN"/>
           </a:p>
@@ -430,7 +451,7 @@
           <a:p>
             <a:fld id="{6434AF71-F664-4075-BB0C-62CC4F811DAC}" type="datetimeFigureOut">
               <a:rPr lang="en-IN" smtClean="0"/>
-              <a:t>06-06-2020</a:t>
+              <a:t>19-07-2020</a:t>
             </a:fld>
             <a:endParaRPr lang="en-IN"/>
           </a:p>
@@ -610,7 +631,7 @@
           <a:p>
             <a:fld id="{6434AF71-F664-4075-BB0C-62CC4F811DAC}" type="datetimeFigureOut">
               <a:rPr lang="en-IN" smtClean="0"/>
-              <a:t>06-06-2020</a:t>
+              <a:t>19-07-2020</a:t>
             </a:fld>
             <a:endParaRPr lang="en-IN"/>
           </a:p>
@@ -780,7 +801,7 @@
           <a:p>
             <a:fld id="{6434AF71-F664-4075-BB0C-62CC4F811DAC}" type="datetimeFigureOut">
               <a:rPr lang="en-IN" smtClean="0"/>
-              <a:t>06-06-2020</a:t>
+              <a:t>19-07-2020</a:t>
             </a:fld>
             <a:endParaRPr lang="en-IN"/>
           </a:p>
@@ -1026,7 +1047,7 @@
           <a:p>
             <a:fld id="{6434AF71-F664-4075-BB0C-62CC4F811DAC}" type="datetimeFigureOut">
               <a:rPr lang="en-IN" smtClean="0"/>
-              <a:t>06-06-2020</a:t>
+              <a:t>19-07-2020</a:t>
             </a:fld>
             <a:endParaRPr lang="en-IN"/>
           </a:p>
@@ -1258,7 +1279,7 @@
           <a:p>
             <a:fld id="{6434AF71-F664-4075-BB0C-62CC4F811DAC}" type="datetimeFigureOut">
               <a:rPr lang="en-IN" smtClean="0"/>
-              <a:t>06-06-2020</a:t>
+              <a:t>19-07-2020</a:t>
             </a:fld>
             <a:endParaRPr lang="en-IN"/>
           </a:p>
@@ -1625,7 +1646,7 @@
           <a:p>
             <a:fld id="{6434AF71-F664-4075-BB0C-62CC4F811DAC}" type="datetimeFigureOut">
               <a:rPr lang="en-IN" smtClean="0"/>
-              <a:t>06-06-2020</a:t>
+              <a:t>19-07-2020</a:t>
             </a:fld>
             <a:endParaRPr lang="en-IN"/>
           </a:p>
@@ -1743,7 +1764,7 @@
           <a:p>
             <a:fld id="{6434AF71-F664-4075-BB0C-62CC4F811DAC}" type="datetimeFigureOut">
               <a:rPr lang="en-IN" smtClean="0"/>
-              <a:t>06-06-2020</a:t>
+              <a:t>19-07-2020</a:t>
             </a:fld>
             <a:endParaRPr lang="en-IN"/>
           </a:p>
@@ -1838,7 +1859,7 @@
           <a:p>
             <a:fld id="{6434AF71-F664-4075-BB0C-62CC4F811DAC}" type="datetimeFigureOut">
               <a:rPr lang="en-IN" smtClean="0"/>
-              <a:t>06-06-2020</a:t>
+              <a:t>19-07-2020</a:t>
             </a:fld>
             <a:endParaRPr lang="en-IN"/>
           </a:p>
@@ -2115,7 +2136,7 @@
           <a:p>
             <a:fld id="{6434AF71-F664-4075-BB0C-62CC4F811DAC}" type="datetimeFigureOut">
               <a:rPr lang="en-IN" smtClean="0"/>
-              <a:t>06-06-2020</a:t>
+              <a:t>19-07-2020</a:t>
             </a:fld>
             <a:endParaRPr lang="en-IN"/>
           </a:p>
@@ -2368,7 +2389,7 @@
           <a:p>
             <a:fld id="{6434AF71-F664-4075-BB0C-62CC4F811DAC}" type="datetimeFigureOut">
               <a:rPr lang="en-IN" smtClean="0"/>
-              <a:t>06-06-2020</a:t>
+              <a:t>19-07-2020</a:t>
             </a:fld>
             <a:endParaRPr lang="en-IN"/>
           </a:p>
@@ -2581,7 +2602,7 @@
           <a:p>
             <a:fld id="{6434AF71-F664-4075-BB0C-62CC4F811DAC}" type="datetimeFigureOut">
               <a:rPr lang="en-IN" smtClean="0"/>
-              <a:t>06-06-2020</a:t>
+              <a:t>19-07-2020</a:t>
             </a:fld>
             <a:endParaRPr lang="en-IN"/>
           </a:p>
@@ -3102,289 +3123,6 @@
           <a:lstStyle/>
           <a:p>
             <a:r>
-              <a:rPr lang="en-US" dirty="0"/>
-              <a:t>.NET Standard Base Class </a:t>
-            </a:r>
-            <a:r>
-              <a:rPr lang="en-US" dirty="0" smtClean="0"/>
-              <a:t>Library</a:t>
-            </a:r>
-            <a:endParaRPr lang="en-IN" dirty="0"/>
-          </a:p>
-        </p:txBody>
-      </p:sp>
-      <p:pic>
-        <p:nvPicPr>
-          <p:cNvPr id="4" name="Content Placeholder 3"/>
-          <p:cNvPicPr>
-            <a:picLocks noGrp="1" noChangeAspect="1"/>
-          </p:cNvPicPr>
-          <p:nvPr>
-            <p:ph idx="1"/>
-          </p:nvPr>
-        </p:nvPicPr>
-        <p:blipFill>
-          <a:blip r:embed="rId2"/>
-          <a:stretch>
-            <a:fillRect/>
-          </a:stretch>
-        </p:blipFill>
-        <p:spPr>
-          <a:xfrm>
-            <a:off x="1376314" y="1825625"/>
-            <a:ext cx="8431677" cy="4698744"/>
-          </a:xfrm>
-          <a:prstGeom prst="rect">
-            <a:avLst/>
-          </a:prstGeom>
-        </p:spPr>
-      </p:pic>
-    </p:spTree>
-    <p:extLst>
-      <p:ext uri="{BB962C8B-B14F-4D97-AF65-F5344CB8AC3E}">
-        <p14:creationId xmlns:p14="http://schemas.microsoft.com/office/powerpoint/2010/main" val="2219760803"/>
-      </p:ext>
-    </p:extLst>
-  </p:cSld>
-  <p:clrMapOvr>
-    <a:masterClrMapping/>
-  </p:clrMapOvr>
-  <p:timing>
-    <p:tnLst>
-      <p:par>
-        <p:cTn id="1" dur="indefinite" restart="never" nodeType="tmRoot"/>
-      </p:par>
-    </p:tnLst>
-  </p:timing>
-</p:sld>
-</file>
-
-<file path=ppt/slides/slide11.xml><?xml version="1.0" encoding="utf-8"?>
-<p:sld xmlns:a="http://schemas.openxmlformats.org/drawingml/2006/main" xmlns:r="http://schemas.openxmlformats.org/officeDocument/2006/relationships" xmlns:p="http://schemas.openxmlformats.org/presentationml/2006/main">
-  <p:cSld>
-    <p:spTree>
-      <p:nvGrpSpPr>
-        <p:cNvPr id="1" name=""/>
-        <p:cNvGrpSpPr/>
-        <p:nvPr/>
-      </p:nvGrpSpPr>
-      <p:grpSpPr>
-        <a:xfrm>
-          <a:off x="0" y="0"/>
-          <a:ext cx="0" cy="0"/>
-          <a:chOff x="0" y="0"/>
-          <a:chExt cx="0" cy="0"/>
-        </a:xfrm>
-      </p:grpSpPr>
-      <p:sp>
-        <p:nvSpPr>
-          <p:cNvPr id="2" name="Title 1"/>
-          <p:cNvSpPr>
-            <a:spLocks noGrp="1"/>
-          </p:cNvSpPr>
-          <p:nvPr>
-            <p:ph type="title"/>
-          </p:nvPr>
-        </p:nvSpPr>
-        <p:spPr/>
-        <p:txBody>
-          <a:bodyPr/>
-          <a:lstStyle/>
-          <a:p>
-            <a:r>
-              <a:rPr lang="en-IN" b="1" dirty="0"/>
-              <a:t>.NET </a:t>
-            </a:r>
-            <a:r>
-              <a:rPr lang="en-IN" b="1" dirty="0" smtClean="0"/>
-              <a:t>Standard Versions</a:t>
-            </a:r>
-            <a:endParaRPr lang="en-IN" dirty="0"/>
-          </a:p>
-        </p:txBody>
-      </p:sp>
-      <p:pic>
-        <p:nvPicPr>
-          <p:cNvPr id="8" name="Content Placeholder 7"/>
-          <p:cNvPicPr>
-            <a:picLocks noGrp="1" noChangeAspect="1"/>
-          </p:cNvPicPr>
-          <p:nvPr>
-            <p:ph idx="1"/>
-          </p:nvPr>
-        </p:nvPicPr>
-        <p:blipFill>
-          <a:blip r:embed="rId2"/>
-          <a:stretch>
-            <a:fillRect/>
-          </a:stretch>
-        </p:blipFill>
-        <p:spPr>
-          <a:xfrm>
-            <a:off x="1342883" y="2209302"/>
-            <a:ext cx="8429570" cy="3468166"/>
-          </a:xfrm>
-          <a:prstGeom prst="rect">
-            <a:avLst/>
-          </a:prstGeom>
-        </p:spPr>
-      </p:pic>
-    </p:spTree>
-    <p:extLst>
-      <p:ext uri="{BB962C8B-B14F-4D97-AF65-F5344CB8AC3E}">
-        <p14:creationId xmlns:p14="http://schemas.microsoft.com/office/powerpoint/2010/main" val="4223069382"/>
-      </p:ext>
-    </p:extLst>
-  </p:cSld>
-  <p:clrMapOvr>
-    <a:masterClrMapping/>
-  </p:clrMapOvr>
-  <p:timing>
-    <p:tnLst>
-      <p:par>
-        <p:cTn id="1" dur="indefinite" restart="never" nodeType="tmRoot"/>
-      </p:par>
-    </p:tnLst>
-  </p:timing>
-</p:sld>
-</file>
-
-<file path=ppt/slides/slide12.xml><?xml version="1.0" encoding="utf-8"?>
-<p:sld xmlns:a="http://schemas.openxmlformats.org/drawingml/2006/main" xmlns:r="http://schemas.openxmlformats.org/officeDocument/2006/relationships" xmlns:p="http://schemas.openxmlformats.org/presentationml/2006/main">
-  <p:cSld>
-    <p:spTree>
-      <p:nvGrpSpPr>
-        <p:cNvPr id="1" name=""/>
-        <p:cNvGrpSpPr/>
-        <p:nvPr/>
-      </p:nvGrpSpPr>
-      <p:grpSpPr>
-        <a:xfrm>
-          <a:off x="0" y="0"/>
-          <a:ext cx="0" cy="0"/>
-          <a:chOff x="0" y="0"/>
-          <a:chExt cx="0" cy="0"/>
-        </a:xfrm>
-      </p:grpSpPr>
-      <p:sp>
-        <p:nvSpPr>
-          <p:cNvPr id="2" name="Title 1"/>
-          <p:cNvSpPr>
-            <a:spLocks noGrp="1"/>
-          </p:cNvSpPr>
-          <p:nvPr>
-            <p:ph type="title"/>
-          </p:nvPr>
-        </p:nvSpPr>
-        <p:spPr/>
-        <p:txBody>
-          <a:bodyPr/>
-          <a:lstStyle/>
-          <a:p>
-            <a:r>
-              <a:rPr lang="en-US" dirty="0" smtClean="0"/>
-              <a:t>.NET Reunification Plan</a:t>
-            </a:r>
-            <a:endParaRPr lang="en-IN" dirty="0"/>
-          </a:p>
-        </p:txBody>
-      </p:sp>
-      <p:pic>
-        <p:nvPicPr>
-          <p:cNvPr id="1026" name="Picture 2" descr="dotnet-timeline.png"/>
-          <p:cNvPicPr>
-            <a:picLocks noGrp="1" noChangeAspect="1" noChangeArrowheads="1"/>
-          </p:cNvPicPr>
-          <p:nvPr>
-            <p:ph idx="1"/>
-          </p:nvPr>
-        </p:nvPicPr>
-        <p:blipFill>
-          <a:blip r:embed="rId2">
-            <a:extLst>
-              <a:ext uri="{28A0092B-C50C-407E-A947-70E740481C1C}">
-                <a14:useLocalDpi xmlns:a14="http://schemas.microsoft.com/office/drawing/2010/main" val="0"/>
-              </a:ext>
-            </a:extLst>
-          </a:blip>
-          <a:srcRect/>
-          <a:stretch>
-            <a:fillRect/>
-          </a:stretch>
-        </p:blipFill>
-        <p:spPr bwMode="auto">
-          <a:xfrm>
-            <a:off x="1219353" y="1690688"/>
-            <a:ext cx="9002819" cy="4807331"/>
-          </a:xfrm>
-          <a:prstGeom prst="rect">
-            <a:avLst/>
-          </a:prstGeom>
-          <a:noFill/>
-          <a:extLst>
-            <a:ext uri="{909E8E84-426E-40DD-AFC4-6F175D3DCCD1}">
-              <a14:hiddenFill xmlns:a14="http://schemas.microsoft.com/office/drawing/2010/main">
-                <a:solidFill>
-                  <a:srgbClr val="FFFFFF"/>
-                </a:solidFill>
-              </a14:hiddenFill>
-            </a:ext>
-          </a:extLst>
-        </p:spPr>
-      </p:pic>
-    </p:spTree>
-    <p:extLst>
-      <p:ext uri="{BB962C8B-B14F-4D97-AF65-F5344CB8AC3E}">
-        <p14:creationId xmlns:p14="http://schemas.microsoft.com/office/powerpoint/2010/main" val="3315123049"/>
-      </p:ext>
-    </p:extLst>
-  </p:cSld>
-  <p:clrMapOvr>
-    <a:masterClrMapping/>
-  </p:clrMapOvr>
-  <p:timing>
-    <p:tnLst>
-      <p:par>
-        <p:cTn id="1" dur="indefinite" restart="never" nodeType="tmRoot"/>
-      </p:par>
-    </p:tnLst>
-  </p:timing>
-</p:sld>
-</file>
-
-<file path=ppt/slides/slide13.xml><?xml version="1.0" encoding="utf-8"?>
-<p:sld xmlns:a="http://schemas.openxmlformats.org/drawingml/2006/main" xmlns:r="http://schemas.openxmlformats.org/officeDocument/2006/relationships" xmlns:p="http://schemas.openxmlformats.org/presentationml/2006/main">
-  <p:cSld>
-    <p:spTree>
-      <p:nvGrpSpPr>
-        <p:cNvPr id="1" name=""/>
-        <p:cNvGrpSpPr/>
-        <p:nvPr/>
-      </p:nvGrpSpPr>
-      <p:grpSpPr>
-        <a:xfrm>
-          <a:off x="0" y="0"/>
-          <a:ext cx="0" cy="0"/>
-          <a:chOff x="0" y="0"/>
-          <a:chExt cx="0" cy="0"/>
-        </a:xfrm>
-      </p:grpSpPr>
-      <p:sp>
-        <p:nvSpPr>
-          <p:cNvPr id="2" name="Title 1"/>
-          <p:cNvSpPr>
-            <a:spLocks noGrp="1"/>
-          </p:cNvSpPr>
-          <p:nvPr>
-            <p:ph type="title"/>
-          </p:nvPr>
-        </p:nvSpPr>
-        <p:spPr/>
-        <p:txBody>
-          <a:bodyPr/>
-          <a:lstStyle/>
-          <a:p>
-            <a:r>
               <a:rPr lang="en-US" dirty="0" smtClean="0"/>
               <a:t>.NET 5 A </a:t>
             </a:r>
@@ -3449,7 +3187,7 @@
 </p:sld>
 </file>
 
-<file path=ppt/slides/slide14.xml><?xml version="1.0" encoding="utf-8"?>
+<file path=ppt/slides/slide11.xml><?xml version="1.0" encoding="utf-8"?>
 <p:sld xmlns:a="http://schemas.openxmlformats.org/drawingml/2006/main" xmlns:r="http://schemas.openxmlformats.org/officeDocument/2006/relationships" xmlns:p="http://schemas.openxmlformats.org/presentationml/2006/main">
   <p:cSld>
     <p:spTree>
@@ -3482,20 +3220,117 @@
           <a:lstStyle/>
           <a:p>
             <a:r>
+              <a:rPr lang="en-US" dirty="0" smtClean="0"/>
+              <a:t>Entity Framework Core </a:t>
+            </a:r>
+            <a:r>
+              <a:rPr lang="en-IN" dirty="0" smtClean="0"/>
+              <a:t>(</a:t>
+            </a:r>
+            <a:r>
               <a:rPr lang="en-IN" dirty="0"/>
-              <a:t>.NET Multi-platform App </a:t>
-            </a:r>
-            <a:r>
-              <a:rPr lang="en-IN" dirty="0" smtClean="0"/>
-              <a:t>UI (MAUI)</a:t>
-            </a:r>
-            <a:endParaRPr lang="en-IN" dirty="0"/>
+              <a:t>O/RM)</a:t>
+            </a:r>
           </a:p>
         </p:txBody>
       </p:sp>
       <p:pic>
         <p:nvPicPr>
-          <p:cNvPr id="2050" name="Picture 2" descr="MAUI overview"/>
+          <p:cNvPr id="4" name="Content Placeholder 3"/>
+          <p:cNvPicPr>
+            <a:picLocks noGrp="1" noChangeAspect="1"/>
+          </p:cNvPicPr>
+          <p:nvPr>
+            <p:ph idx="1"/>
+          </p:nvPr>
+        </p:nvPicPr>
+        <p:blipFill>
+          <a:blip r:embed="rId2"/>
+          <a:stretch>
+            <a:fillRect/>
+          </a:stretch>
+        </p:blipFill>
+        <p:spPr>
+          <a:xfrm>
+            <a:off x="988325" y="2214786"/>
+            <a:ext cx="9127504" cy="3940353"/>
+          </a:xfrm>
+          <a:prstGeom prst="rect">
+            <a:avLst/>
+          </a:prstGeom>
+        </p:spPr>
+      </p:pic>
+    </p:spTree>
+    <p:extLst>
+      <p:ext uri="{BB962C8B-B14F-4D97-AF65-F5344CB8AC3E}">
+        <p14:creationId xmlns:p14="http://schemas.microsoft.com/office/powerpoint/2010/main" val="1366840127"/>
+      </p:ext>
+    </p:extLst>
+  </p:cSld>
+  <p:clrMapOvr>
+    <a:masterClrMapping/>
+  </p:clrMapOvr>
+  <p:timing>
+    <p:tnLst>
+      <p:par>
+        <p:cTn id="1" dur="indefinite" restart="never" nodeType="tmRoot"/>
+      </p:par>
+    </p:tnLst>
+  </p:timing>
+</p:sld>
+</file>
+
+<file path=ppt/slides/slide12.xml><?xml version="1.0" encoding="utf-8"?>
+<p:sld xmlns:a="http://schemas.openxmlformats.org/drawingml/2006/main" xmlns:r="http://schemas.openxmlformats.org/officeDocument/2006/relationships" xmlns:p="http://schemas.openxmlformats.org/presentationml/2006/main">
+  <p:cSld>
+    <p:spTree>
+      <p:nvGrpSpPr>
+        <p:cNvPr id="1" name=""/>
+        <p:cNvGrpSpPr/>
+        <p:nvPr/>
+      </p:nvGrpSpPr>
+      <p:grpSpPr>
+        <a:xfrm>
+          <a:off x="0" y="0"/>
+          <a:ext cx="0" cy="0"/>
+          <a:chOff x="0" y="0"/>
+          <a:chExt cx="0" cy="0"/>
+        </a:xfrm>
+      </p:grpSpPr>
+      <p:sp>
+        <p:nvSpPr>
+          <p:cNvPr id="2" name="Title 1"/>
+          <p:cNvSpPr>
+            <a:spLocks noGrp="1"/>
+          </p:cNvSpPr>
+          <p:nvPr>
+            <p:ph type="title"/>
+          </p:nvPr>
+        </p:nvSpPr>
+        <p:spPr/>
+        <p:txBody>
+          <a:bodyPr/>
+          <a:lstStyle/>
+          <a:p>
+            <a:r>
+              <a:rPr lang="en-US" dirty="0" smtClean="0"/>
+              <a:t>Modern</a:t>
+            </a:r>
+            <a:r>
+              <a:rPr lang="en-US" dirty="0" smtClean="0"/>
+              <a:t> </a:t>
+            </a:r>
+            <a:r>
+              <a:rPr lang="en-US" dirty="0" smtClean="0"/>
+              <a:t>Windows UI Library (WinUI)</a:t>
+            </a:r>
+            <a:endParaRPr lang="en-IN" dirty="0"/>
+          </a:p>
+        </p:txBody>
+      </p:sp>
+      <p:pic>
+        <p:nvPicPr>
+          <p:cNvPr id="1026" name="Picture 2" descr="WinUI 3 platform support"/>
           <p:cNvPicPr>
             <a:picLocks noGrp="1" noChangeAspect="1" noChangeArrowheads="1"/>
           </p:cNvPicPr>
@@ -3518,8 +3353,8 @@
         </p:blipFill>
         <p:spPr bwMode="auto">
           <a:xfrm>
-            <a:off x="1462300" y="1690688"/>
-            <a:ext cx="8432327" cy="4741262"/>
+            <a:off x="1303957" y="1690688"/>
+            <a:ext cx="8795221" cy="3399927"/>
           </a:xfrm>
           <a:prstGeom prst="rect">
             <a:avLst/>
@@ -3536,6 +3371,223 @@
           </a:extLst>
         </p:spPr>
       </p:pic>
+      <p:sp>
+        <p:nvSpPr>
+          <p:cNvPr id="3" name="Rectangle 2"/>
+          <p:cNvSpPr/>
+          <p:nvPr/>
+        </p:nvSpPr>
+        <p:spPr>
+          <a:xfrm>
+            <a:off x="1303958" y="5332441"/>
+            <a:ext cx="8590669" cy="1200329"/>
+          </a:xfrm>
+          <a:prstGeom prst="rect">
+            <a:avLst/>
+          </a:prstGeom>
+        </p:spPr>
+        <p:txBody>
+          <a:bodyPr wrap="square">
+            <a:spAutoFit/>
+          </a:bodyPr>
+          <a:lstStyle/>
+          <a:p>
+            <a:r>
+              <a:rPr lang="en-IN" dirty="0" smtClean="0">
+                <a:solidFill>
+                  <a:srgbClr val="24292E"/>
+                </a:solidFill>
+                <a:latin typeface="-apple-system"/>
+              </a:rPr>
+              <a:t>Modern Windows UI Library decoupled </a:t>
+            </a:r>
+            <a:r>
+              <a:rPr lang="en-IN" dirty="0">
+                <a:solidFill>
+                  <a:srgbClr val="24292E"/>
+                </a:solidFill>
+                <a:latin typeface="-apple-system"/>
+              </a:rPr>
+              <a:t>from the UWP </a:t>
+            </a:r>
+            <a:r>
+              <a:rPr lang="en-IN" dirty="0" smtClean="0">
+                <a:solidFill>
+                  <a:srgbClr val="24292E"/>
+                </a:solidFill>
+                <a:latin typeface="-apple-system"/>
+              </a:rPr>
+              <a:t>SDK. New App can be developed for both Win32 and UWP Platforms. It can also be used to gradually </a:t>
+            </a:r>
+            <a:r>
+              <a:rPr lang="en-IN" dirty="0">
+                <a:solidFill>
+                  <a:srgbClr val="24292E"/>
+                </a:solidFill>
+                <a:latin typeface="-apple-system"/>
+              </a:rPr>
+              <a:t>migrate </a:t>
+            </a:r>
+            <a:r>
+              <a:rPr lang="en-IN" dirty="0" smtClean="0">
+                <a:solidFill>
+                  <a:srgbClr val="24292E"/>
+                </a:solidFill>
+                <a:latin typeface="-apple-system"/>
+              </a:rPr>
+              <a:t>existing </a:t>
+            </a:r>
+            <a:r>
+              <a:rPr lang="en-IN" dirty="0">
+                <a:solidFill>
+                  <a:srgbClr val="24292E"/>
+                </a:solidFill>
+                <a:latin typeface="-apple-system"/>
+              </a:rPr>
+              <a:t>MFC, WinForms, or WPF apps using familiar languages such as C++, C#, Visual Basic, and </a:t>
+            </a:r>
+            <a:r>
+              <a:rPr lang="en-IN" dirty="0" smtClean="0">
+                <a:solidFill>
+                  <a:srgbClr val="24292E"/>
+                </a:solidFill>
+                <a:latin typeface="-apple-system"/>
+              </a:rPr>
+              <a:t>JavaScript</a:t>
+            </a:r>
+            <a:r>
+              <a:rPr lang="en-IN" dirty="0">
+                <a:solidFill>
+                  <a:srgbClr val="24292E"/>
+                </a:solidFill>
+                <a:latin typeface="-apple-system"/>
+              </a:rPr>
+              <a:t>.</a:t>
+            </a:r>
+            <a:endParaRPr lang="en-IN" dirty="0"/>
+          </a:p>
+        </p:txBody>
+      </p:sp>
+    </p:spTree>
+    <p:extLst>
+      <p:ext uri="{BB962C8B-B14F-4D97-AF65-F5344CB8AC3E}">
+        <p14:creationId xmlns:p14="http://schemas.microsoft.com/office/powerpoint/2010/main" val="1423040608"/>
+      </p:ext>
+    </p:extLst>
+  </p:cSld>
+  <p:clrMapOvr>
+    <a:masterClrMapping/>
+  </p:clrMapOvr>
+  <p:timing>
+    <p:tnLst>
+      <p:par>
+        <p:cTn id="1" dur="indefinite" restart="never" nodeType="tmRoot"/>
+      </p:par>
+    </p:tnLst>
+  </p:timing>
+</p:sld>
+</file>
+
+<file path=ppt/slides/slide13.xml><?xml version="1.0" encoding="utf-8"?>
+<p:sld xmlns:a="http://schemas.openxmlformats.org/drawingml/2006/main" xmlns:r="http://schemas.openxmlformats.org/officeDocument/2006/relationships" xmlns:p="http://schemas.openxmlformats.org/presentationml/2006/main">
+  <p:cSld>
+    <p:spTree>
+      <p:nvGrpSpPr>
+        <p:cNvPr id="1" name=""/>
+        <p:cNvGrpSpPr/>
+        <p:nvPr/>
+      </p:nvGrpSpPr>
+      <p:grpSpPr>
+        <a:xfrm>
+          <a:off x="0" y="0"/>
+          <a:ext cx="0" cy="0"/>
+          <a:chOff x="0" y="0"/>
+          <a:chExt cx="0" cy="0"/>
+        </a:xfrm>
+      </p:grpSpPr>
+      <p:sp>
+        <p:nvSpPr>
+          <p:cNvPr id="2" name="Title 1"/>
+          <p:cNvSpPr>
+            <a:spLocks noGrp="1"/>
+          </p:cNvSpPr>
+          <p:nvPr>
+            <p:ph type="title"/>
+          </p:nvPr>
+        </p:nvSpPr>
+        <p:spPr/>
+        <p:txBody>
+          <a:bodyPr/>
+          <a:lstStyle/>
+          <a:p>
+            <a:r>
+              <a:rPr lang="en-IN" dirty="0"/>
+              <a:t>.NET Multi-platform App </a:t>
+            </a:r>
+            <a:r>
+              <a:rPr lang="en-IN" dirty="0" smtClean="0"/>
+              <a:t>UI (MAUI)</a:t>
+            </a:r>
+            <a:endParaRPr lang="en-IN" dirty="0"/>
+          </a:p>
+        </p:txBody>
+      </p:sp>
+      <p:sp>
+        <p:nvSpPr>
+          <p:cNvPr id="3" name="Content Placeholder 2"/>
+          <p:cNvSpPr>
+            <a:spLocks noGrp="1"/>
+          </p:cNvSpPr>
+          <p:nvPr>
+            <p:ph idx="1"/>
+          </p:nvPr>
+        </p:nvSpPr>
+        <p:spPr/>
+        <p:txBody>
+          <a:bodyPr/>
+          <a:lstStyle/>
+          <a:p>
+            <a:r>
+              <a:rPr lang="en-IN" dirty="0"/>
+              <a:t>Multi-platform native UI</a:t>
+            </a:r>
+          </a:p>
+          <a:p>
+            <a:r>
+              <a:rPr lang="en-IN" dirty="0"/>
+              <a:t>Deploy to multiple devices across mobile &amp; desktop</a:t>
+            </a:r>
+          </a:p>
+          <a:p>
+            <a:r>
+              <a:rPr lang="en-IN" dirty="0"/>
+              <a:t>Using a single project, single codebase</a:t>
+            </a:r>
+          </a:p>
+          <a:p>
+            <a:r>
+              <a:rPr lang="en-IN" dirty="0"/>
+              <a:t>Evolution of </a:t>
+            </a:r>
+            <a:r>
+              <a:rPr lang="en-IN" dirty="0" smtClean="0"/>
+              <a:t> Mono Xamarian.Forms</a:t>
+            </a:r>
+            <a:endParaRPr lang="en-IN" dirty="0"/>
+          </a:p>
+          <a:p>
+            <a:r>
+              <a:rPr lang="en-IN" dirty="0"/>
+              <a:t>Targeting .NET </a:t>
+            </a:r>
+            <a:r>
+              <a:rPr lang="en-IN" dirty="0" smtClean="0"/>
+              <a:t>6  LST (Nov/2021).</a:t>
+            </a:r>
+            <a:endParaRPr lang="en-IN" dirty="0"/>
+          </a:p>
+        </p:txBody>
+      </p:sp>
     </p:spTree>
     <p:extLst>
       <p:ext uri="{BB962C8B-B14F-4D97-AF65-F5344CB8AC3E}">
@@ -3556,6 +3608,98 @@
 </p:sld>
 </file>
 
+<file path=ppt/slides/slide14.xml><?xml version="1.0" encoding="utf-8"?>
+<p:sld xmlns:a="http://schemas.openxmlformats.org/drawingml/2006/main" xmlns:r="http://schemas.openxmlformats.org/officeDocument/2006/relationships" xmlns:p="http://schemas.openxmlformats.org/presentationml/2006/main">
+  <p:cSld>
+    <p:spTree>
+      <p:nvGrpSpPr>
+        <p:cNvPr id="1" name=""/>
+        <p:cNvGrpSpPr/>
+        <p:nvPr/>
+      </p:nvGrpSpPr>
+      <p:grpSpPr>
+        <a:xfrm>
+          <a:off x="0" y="0"/>
+          <a:ext cx="0" cy="0"/>
+          <a:chOff x="0" y="0"/>
+          <a:chExt cx="0" cy="0"/>
+        </a:xfrm>
+      </p:grpSpPr>
+      <p:sp>
+        <p:nvSpPr>
+          <p:cNvPr id="4" name="Title 1"/>
+          <p:cNvSpPr>
+            <a:spLocks noGrp="1"/>
+          </p:cNvSpPr>
+          <p:nvPr>
+            <p:ph type="title"/>
+          </p:nvPr>
+        </p:nvSpPr>
+        <p:spPr>
+          <a:xfrm>
+            <a:off x="838200" y="365125"/>
+            <a:ext cx="10515600" cy="1325563"/>
+          </a:xfrm>
+        </p:spPr>
+        <p:txBody>
+          <a:bodyPr/>
+          <a:lstStyle/>
+          <a:p>
+            <a:r>
+              <a:rPr lang="en-US" dirty="0" smtClean="0"/>
+              <a:t>Evolution of</a:t>
+            </a:r>
+            <a:r>
+              <a:rPr lang="en-US" dirty="0" smtClean="0"/>
+              <a:t> MS Development </a:t>
+            </a:r>
+            <a:r>
+              <a:rPr lang="en-US" dirty="0"/>
+              <a:t>Technology</a:t>
+            </a:r>
+            <a:endParaRPr lang="en-IN" dirty="0"/>
+          </a:p>
+        </p:txBody>
+      </p:sp>
+      <p:pic>
+        <p:nvPicPr>
+          <p:cNvPr id="5" name="Content Placeholder 4"/>
+          <p:cNvPicPr>
+            <a:picLocks noGrp="1" noChangeAspect="1"/>
+          </p:cNvPicPr>
+          <p:nvPr>
+            <p:ph idx="1"/>
+          </p:nvPr>
+        </p:nvPicPr>
+        <p:blipFill>
+          <a:blip r:embed="rId2"/>
+          <a:stretch>
+            <a:fillRect/>
+          </a:stretch>
+        </p:blipFill>
+        <p:spPr>
+          <a:xfrm>
+            <a:off x="1311820" y="1690688"/>
+            <a:ext cx="9311053" cy="4327975"/>
+          </a:xfrm>
+          <a:prstGeom prst="rect">
+            <a:avLst/>
+          </a:prstGeom>
+        </p:spPr>
+      </p:pic>
+    </p:spTree>
+    <p:extLst>
+      <p:ext uri="{BB962C8B-B14F-4D97-AF65-F5344CB8AC3E}">
+        <p14:creationId xmlns:p14="http://schemas.microsoft.com/office/powerpoint/2010/main" val="3536711948"/>
+      </p:ext>
+    </p:extLst>
+  </p:cSld>
+  <p:clrMapOvr>
+    <a:masterClrMapping/>
+  </p:clrMapOvr>
+</p:sld>
+</file>
+
 <file path=ppt/slides/slide15.xml><?xml version="1.0" encoding="utf-8"?>
 <p:sld xmlns:a="http://schemas.openxmlformats.org/drawingml/2006/main" xmlns:r="http://schemas.openxmlformats.org/officeDocument/2006/relationships" xmlns:p="http://schemas.openxmlformats.org/presentationml/2006/main">
   <p:cSld>
@@ -3583,18 +3727,27 @@
             <p:ph type="title"/>
           </p:nvPr>
         </p:nvSpPr>
-        <p:spPr/>
-        <p:txBody>
-          <a:bodyPr/>
-          <a:lstStyle/>
-          <a:p>
-            <a:r>
-              <a:rPr lang="en-US" dirty="0"/>
-              <a:t>Evolution of </a:t>
-            </a:r>
+        <p:spPr>
+          <a:xfrm>
+            <a:off x="838200" y="365125"/>
+            <a:ext cx="9725167" cy="1325563"/>
+          </a:xfrm>
+        </p:spPr>
+        <p:txBody>
+          <a:bodyPr/>
+          <a:lstStyle/>
+          <a:p>
             <a:r>
               <a:rPr lang="en-US" dirty="0" smtClean="0"/>
-              <a:t>.Net Tooling</a:t>
+              <a:t>Microsoft Visual </a:t>
+            </a:r>
+            <a:r>
+              <a:rPr lang="en-US" dirty="0" smtClean="0"/>
+              <a:t>Studio </a:t>
+            </a:r>
+            <a:r>
+              <a:rPr lang="en-US" dirty="0" smtClean="0"/>
+              <a:t>.NET Tooling</a:t>
             </a:r>
             <a:endParaRPr lang="en-IN" dirty="0"/>
           </a:p>
@@ -3602,7 +3755,7 @@
       </p:sp>
       <p:pic>
         <p:nvPicPr>
-          <p:cNvPr id="5" name="Content Placeholder 4"/>
+          <p:cNvPr id="4" name="Content Placeholder 3"/>
           <p:cNvPicPr>
             <a:picLocks noGrp="1" noChangeAspect="1"/>
           </p:cNvPicPr>
@@ -3618,8 +3771,8 @@
         </p:blipFill>
         <p:spPr>
           <a:xfrm>
-            <a:off x="1318499" y="1579965"/>
-            <a:ext cx="8790772" cy="4848130"/>
+            <a:off x="1390891" y="1622449"/>
+            <a:ext cx="8026065" cy="4590014"/>
           </a:xfrm>
           <a:prstGeom prst="rect">
             <a:avLst/>
@@ -3679,8 +3832,8 @@
           <a:lstStyle/>
           <a:p>
             <a:r>
-              <a:rPr lang="en-US" dirty="0"/>
-              <a:t>Microsoft Open Sourced Technology</a:t>
+              <a:rPr lang="en-US" dirty="0" smtClean="0"/>
+              <a:t>Year 2020 – Technology in Focus</a:t>
             </a:r>
             <a:endParaRPr lang="en-IN" dirty="0"/>
           </a:p>
@@ -3688,66 +3841,293 @@
       </p:sp>
       <p:sp>
         <p:nvSpPr>
-          <p:cNvPr id="3" name="Content Placeholder 2"/>
-          <p:cNvSpPr>
-            <a:spLocks noGrp="1"/>
-          </p:cNvSpPr>
-          <p:nvPr>
-            <p:ph idx="1"/>
-          </p:nvPr>
-        </p:nvSpPr>
-        <p:spPr/>
-        <p:txBody>
-          <a:bodyPr/>
-          <a:lstStyle/>
-          <a:p>
-            <a:r>
-              <a:rPr lang="en-US" dirty="0"/>
-              <a:t>.Net Core</a:t>
-            </a:r>
-          </a:p>
-          <a:p>
-            <a:r>
-              <a:rPr lang="en-US" dirty="0"/>
-              <a:t>WinForms</a:t>
-            </a:r>
-          </a:p>
-          <a:p>
-            <a:r>
-              <a:rPr lang="en-US" dirty="0"/>
-              <a:t>WPF</a:t>
-            </a:r>
-          </a:p>
-          <a:p>
-            <a:r>
-              <a:rPr lang="en-US" dirty="0" smtClean="0"/>
-              <a:t>WinUI</a:t>
-            </a:r>
-          </a:p>
-          <a:p>
-            <a:r>
-              <a:rPr lang="en-US" dirty="0" smtClean="0"/>
-              <a:t>MAUI</a:t>
-            </a:r>
-          </a:p>
-          <a:p>
-            <a:r>
-              <a:rPr lang="en-US" dirty="0"/>
-              <a:t>ASP.Net Core</a:t>
-            </a:r>
-          </a:p>
-          <a:p>
-            <a:endParaRPr lang="en-IN" dirty="0"/>
-          </a:p>
-          <a:p>
-            <a:endParaRPr lang="en-IN" dirty="0"/>
+          <p:cNvPr id="3" name="Donut 2"/>
+          <p:cNvSpPr/>
+          <p:nvPr/>
+        </p:nvSpPr>
+        <p:spPr>
+          <a:xfrm>
+            <a:off x="2060810" y="1897038"/>
+            <a:ext cx="1992574" cy="1992573"/>
+          </a:xfrm>
+          <a:prstGeom prst="donut">
+            <a:avLst>
+              <a:gd name="adj" fmla="val 6485"/>
+            </a:avLst>
+          </a:prstGeom>
+          <a:solidFill>
+            <a:schemeClr val="accent1"/>
+          </a:solidFill>
+        </p:spPr>
+        <p:style>
+          <a:lnRef idx="2">
+            <a:schemeClr val="accent1">
+              <a:shade val="50000"/>
+            </a:schemeClr>
+          </a:lnRef>
+          <a:fillRef idx="1">
+            <a:schemeClr val="accent1"/>
+          </a:fillRef>
+          <a:effectRef idx="0">
+            <a:schemeClr val="accent1"/>
+          </a:effectRef>
+          <a:fontRef idx="minor">
+            <a:schemeClr val="lt1"/>
+          </a:fontRef>
+        </p:style>
+        <p:txBody>
+          <a:bodyPr rtlCol="0" anchor="ctr"/>
+          <a:lstStyle/>
+          <a:p>
+            <a:pPr algn="ctr"/>
+            <a:r>
+              <a:rPr lang="en-US" sz="2800" b="1" dirty="0" smtClean="0">
+                <a:solidFill>
+                  <a:schemeClr val="tx1"/>
+                </a:solidFill>
+              </a:rPr>
+              <a:t>.NET 5</a:t>
+            </a:r>
+            <a:endParaRPr lang="en-IN" sz="2800" b="1" dirty="0">
+              <a:solidFill>
+                <a:schemeClr val="tx1"/>
+              </a:solidFill>
+            </a:endParaRPr>
+          </a:p>
+        </p:txBody>
+      </p:sp>
+      <p:sp>
+        <p:nvSpPr>
+          <p:cNvPr id="6" name="Donut 5"/>
+          <p:cNvSpPr/>
+          <p:nvPr/>
+        </p:nvSpPr>
+        <p:spPr>
+          <a:xfrm>
+            <a:off x="5119610" y="3642808"/>
+            <a:ext cx="1992574" cy="1992573"/>
+          </a:xfrm>
+          <a:prstGeom prst="donut">
+            <a:avLst>
+              <a:gd name="adj" fmla="val 6485"/>
+            </a:avLst>
+          </a:prstGeom>
+          <a:solidFill>
+            <a:schemeClr val="accent6"/>
+          </a:solidFill>
+        </p:spPr>
+        <p:style>
+          <a:lnRef idx="2">
+            <a:schemeClr val="accent1">
+              <a:shade val="50000"/>
+            </a:schemeClr>
+          </a:lnRef>
+          <a:fillRef idx="1">
+            <a:schemeClr val="accent1"/>
+          </a:fillRef>
+          <a:effectRef idx="0">
+            <a:schemeClr val="accent1"/>
+          </a:effectRef>
+          <a:fontRef idx="minor">
+            <a:schemeClr val="lt1"/>
+          </a:fontRef>
+        </p:style>
+        <p:txBody>
+          <a:bodyPr rtlCol="0" anchor="ctr"/>
+          <a:lstStyle/>
+          <a:p>
+            <a:pPr algn="ctr"/>
+            <a:r>
+              <a:rPr lang="en-US" sz="2800" b="1" dirty="0" smtClean="0">
+                <a:solidFill>
+                  <a:schemeClr val="tx1"/>
+                </a:solidFill>
+              </a:rPr>
+              <a:t>Azure</a:t>
+            </a:r>
+            <a:endParaRPr lang="en-IN" sz="2800" b="1" dirty="0">
+              <a:solidFill>
+                <a:schemeClr val="tx1"/>
+              </a:solidFill>
+            </a:endParaRPr>
+          </a:p>
+        </p:txBody>
+      </p:sp>
+      <p:sp>
+        <p:nvSpPr>
+          <p:cNvPr id="8" name="Donut 7"/>
+          <p:cNvSpPr/>
+          <p:nvPr/>
+        </p:nvSpPr>
+        <p:spPr>
+          <a:xfrm>
+            <a:off x="6134663" y="1895900"/>
+            <a:ext cx="1992574" cy="1992573"/>
+          </a:xfrm>
+          <a:prstGeom prst="donut">
+            <a:avLst>
+              <a:gd name="adj" fmla="val 6485"/>
+            </a:avLst>
+          </a:prstGeom>
+          <a:solidFill>
+            <a:schemeClr val="accent2"/>
+          </a:solidFill>
+        </p:spPr>
+        <p:style>
+          <a:lnRef idx="2">
+            <a:schemeClr val="accent1">
+              <a:shade val="50000"/>
+            </a:schemeClr>
+          </a:lnRef>
+          <a:fillRef idx="1">
+            <a:schemeClr val="accent1"/>
+          </a:fillRef>
+          <a:effectRef idx="0">
+            <a:schemeClr val="accent1"/>
+          </a:effectRef>
+          <a:fontRef idx="minor">
+            <a:schemeClr val="lt1"/>
+          </a:fontRef>
+        </p:style>
+        <p:txBody>
+          <a:bodyPr rtlCol="0" anchor="ctr"/>
+          <a:lstStyle/>
+          <a:p>
+            <a:pPr algn="ctr"/>
+            <a:r>
+              <a:rPr lang="en-US" sz="2800" b="1" dirty="0" smtClean="0">
+                <a:solidFill>
+                  <a:schemeClr val="tx1"/>
+                </a:solidFill>
+              </a:rPr>
+              <a:t>AKS</a:t>
+            </a:r>
+            <a:endParaRPr lang="en-IN" sz="2800" b="1" dirty="0">
+              <a:solidFill>
+                <a:schemeClr val="tx1"/>
+              </a:solidFill>
+            </a:endParaRPr>
+          </a:p>
+        </p:txBody>
+      </p:sp>
+      <p:sp>
+        <p:nvSpPr>
+          <p:cNvPr id="9" name="Donut 8"/>
+          <p:cNvSpPr/>
+          <p:nvPr/>
+        </p:nvSpPr>
+        <p:spPr>
+          <a:xfrm>
+            <a:off x="4090911" y="1895900"/>
+            <a:ext cx="1992574" cy="1992573"/>
+          </a:xfrm>
+          <a:prstGeom prst="donut">
+            <a:avLst>
+              <a:gd name="adj" fmla="val 6485"/>
+            </a:avLst>
+          </a:prstGeom>
+          <a:solidFill>
+            <a:schemeClr val="tx1"/>
+          </a:solidFill>
+        </p:spPr>
+        <p:style>
+          <a:lnRef idx="2">
+            <a:schemeClr val="accent1">
+              <a:shade val="50000"/>
+            </a:schemeClr>
+          </a:lnRef>
+          <a:fillRef idx="1">
+            <a:schemeClr val="accent1"/>
+          </a:fillRef>
+          <a:effectRef idx="0">
+            <a:schemeClr val="accent1"/>
+          </a:effectRef>
+          <a:fontRef idx="minor">
+            <a:schemeClr val="lt1"/>
+          </a:fontRef>
+        </p:style>
+        <p:txBody>
+          <a:bodyPr rtlCol="0" anchor="ctr"/>
+          <a:lstStyle/>
+          <a:p>
+            <a:pPr algn="ctr"/>
+            <a:r>
+              <a:rPr lang="en-US" sz="2800" b="1" dirty="0" smtClean="0">
+                <a:solidFill>
+                  <a:schemeClr val="tx1"/>
+                </a:solidFill>
+              </a:rPr>
+              <a:t>WinUI 3</a:t>
+            </a:r>
+            <a:endParaRPr lang="en-IN" sz="2800" b="1" dirty="0">
+              <a:solidFill>
+                <a:schemeClr val="tx1"/>
+              </a:solidFill>
+            </a:endParaRPr>
+          </a:p>
+        </p:txBody>
+      </p:sp>
+      <p:sp>
+        <p:nvSpPr>
+          <p:cNvPr id="11" name="Donut 10"/>
+          <p:cNvSpPr/>
+          <p:nvPr/>
+        </p:nvSpPr>
+        <p:spPr>
+          <a:xfrm>
+            <a:off x="3089509" y="3642809"/>
+            <a:ext cx="1992574" cy="1992573"/>
+          </a:xfrm>
+          <a:prstGeom prst="donut">
+            <a:avLst>
+              <a:gd name="adj" fmla="val 6485"/>
+            </a:avLst>
+          </a:prstGeom>
+          <a:solidFill>
+            <a:schemeClr val="accent4"/>
+          </a:solidFill>
+        </p:spPr>
+        <p:style>
+          <a:lnRef idx="2">
+            <a:schemeClr val="accent1">
+              <a:shade val="50000"/>
+            </a:schemeClr>
+          </a:lnRef>
+          <a:fillRef idx="1">
+            <a:schemeClr val="accent1"/>
+          </a:fillRef>
+          <a:effectRef idx="0">
+            <a:schemeClr val="accent1"/>
+          </a:effectRef>
+          <a:fontRef idx="minor">
+            <a:schemeClr val="lt1"/>
+          </a:fontRef>
+        </p:style>
+        <p:txBody>
+          <a:bodyPr rtlCol="0" anchor="ctr"/>
+          <a:lstStyle/>
+          <a:p>
+            <a:pPr algn="ctr"/>
+            <a:r>
+              <a:rPr lang="en-US" sz="2800" b="1" dirty="0" smtClean="0">
+                <a:solidFill>
+                  <a:schemeClr val="tx1"/>
+                </a:solidFill>
+              </a:rPr>
+              <a:t>WSL 2</a:t>
+            </a:r>
+            <a:endParaRPr lang="en-IN" sz="2800" b="1" dirty="0">
+              <a:solidFill>
+                <a:schemeClr val="tx1"/>
+              </a:solidFill>
+            </a:endParaRPr>
           </a:p>
         </p:txBody>
       </p:sp>
     </p:spTree>
     <p:extLst>
       <p:ext uri="{BB962C8B-B14F-4D97-AF65-F5344CB8AC3E}">
-        <p14:creationId xmlns:p14="http://schemas.microsoft.com/office/powerpoint/2010/main" val="3032068795"/>
+        <p14:creationId xmlns:p14="http://schemas.microsoft.com/office/powerpoint/2010/main" val="1579680709"/>
       </p:ext>
     </p:extLst>
   </p:cSld>
@@ -3816,65 +4196,92 @@
         </p:nvSpPr>
         <p:spPr/>
         <p:txBody>
-          <a:bodyPr/>
-          <a:lstStyle/>
-          <a:p>
+          <a:bodyPr>
+            <a:normAutofit fontScale="92500" lnSpcReduction="10000"/>
+          </a:bodyPr>
+          <a:lstStyle/>
+          <a:p>
+            <a:pPr marL="0" indent="0">
+              <a:buNone/>
+            </a:pPr>
             <a:r>
               <a:rPr lang="en-IN" dirty="0">
                 <a:hlinkClick r:id="rId2"/>
               </a:rPr>
-              <a:t>https://github.com/dotnet/core</a:t>
-            </a:r>
-            <a:endParaRPr lang="en-IN" dirty="0"/>
-          </a:p>
-          <a:p>
+              <a:t>https://</a:t>
+            </a:r>
+            <a:r>
+              <a:rPr lang="en-IN" dirty="0" smtClean="0">
+                <a:hlinkClick r:id="rId2"/>
+              </a:rPr>
+              <a:t>docs.microsoft.com/en-us/archive/msdn-magazine/2019/july/csharp-net-reunified-microsoft%E2%80%99s-plans-for-net-5</a:t>
+            </a:r>
+            <a:endParaRPr lang="en-IN" dirty="0" smtClean="0"/>
+          </a:p>
+          <a:p>
+            <a:pPr marL="0" indent="0">
+              <a:buNone/>
+            </a:pPr>
+            <a:endParaRPr lang="en-US" dirty="0"/>
+          </a:p>
+          <a:p>
+            <a:pPr marL="0" indent="0">
+              <a:buNone/>
+            </a:pPr>
             <a:r>
               <a:rPr lang="en-IN" dirty="0">
                 <a:hlinkClick r:id="rId3"/>
               </a:rPr>
-              <a:t>https://github.com/dotnet/winforms</a:t>
-            </a:r>
-            <a:endParaRPr lang="en-IN" dirty="0"/>
-          </a:p>
-          <a:p>
+              <a:t>https://</a:t>
+            </a:r>
+            <a:r>
+              <a:rPr lang="en-IN" dirty="0" smtClean="0">
+                <a:hlinkClick r:id="rId3"/>
+              </a:rPr>
+              <a:t>medium.com/young-coder/the-reunification-of-net-5-5902744df9fe</a:t>
+            </a:r>
+            <a:endParaRPr lang="en-IN" dirty="0" smtClean="0"/>
+          </a:p>
+          <a:p>
+            <a:pPr marL="0" indent="0">
+              <a:buNone/>
+            </a:pPr>
+            <a:endParaRPr lang="en-IN" dirty="0" smtClean="0"/>
+          </a:p>
+          <a:p>
+            <a:pPr marL="0" indent="0">
+              <a:buNone/>
+            </a:pPr>
             <a:r>
               <a:rPr lang="en-IN" dirty="0">
                 <a:hlinkClick r:id="rId4"/>
               </a:rPr>
-              <a:t>https://github.com/dotnet/wpf</a:t>
-            </a:r>
-            <a:endParaRPr lang="en-IN" dirty="0"/>
-          </a:p>
-          <a:p>
+              <a:t>https://</a:t>
+            </a:r>
+            <a:r>
+              <a:rPr lang="en-IN" dirty="0" smtClean="0">
+                <a:hlinkClick r:id="rId4"/>
+              </a:rPr>
+              <a:t>docs.microsoft.com/en-us/windows/win32/appuistart/user-interface-technologies-for-windows-applications</a:t>
+            </a:r>
+            <a:endParaRPr lang="en-IN" dirty="0" smtClean="0"/>
+          </a:p>
+          <a:p>
+            <a:pPr marL="0" indent="0">
+              <a:buNone/>
+            </a:pPr>
+            <a:endParaRPr lang="en-US" dirty="0"/>
+          </a:p>
+          <a:p>
+            <a:pPr marL="0" indent="0">
+              <a:buNone/>
+            </a:pPr>
             <a:r>
               <a:rPr lang="en-IN" dirty="0">
                 <a:hlinkClick r:id="rId5"/>
               </a:rPr>
-              <a:t>https://github.com/dotnet/maui</a:t>
-            </a:r>
-            <a:endParaRPr lang="en-IN" dirty="0"/>
-          </a:p>
-          <a:p>
-            <a:r>
-              <a:rPr lang="en-IN" dirty="0">
-                <a:hlinkClick r:id="rId6"/>
-              </a:rPr>
-              <a:t>https://microsoft.github.io/microsoft-ui-xaml/</a:t>
-            </a:r>
-            <a:endParaRPr lang="en-IN" dirty="0"/>
-          </a:p>
-          <a:p>
-            <a:r>
-              <a:rPr lang="en-IN" dirty="0">
-                <a:hlinkClick r:id="rId7"/>
-              </a:rPr>
-              <a:t>https://github.com/dotnet/aspnetcore</a:t>
-            </a:r>
-          </a:p>
-          <a:p>
-            <a:pPr marL="0" indent="0">
-              <a:buNone/>
-            </a:pPr>
+              <a:t>https://docs.microsoft.com/en-us/windows/uwp/porting/android-ios-uwp-map</a:t>
+            </a:r>
             <a:endParaRPr lang="en-IN" dirty="0"/>
           </a:p>
         </p:txBody>
@@ -4023,45 +4430,103 @@
           <a:p>
             <a:r>
               <a:rPr lang="en-US" dirty="0"/>
-              <a:t>.NET Framework (Microsoft</a:t>
+              <a:t>Major .NET </a:t>
             </a:r>
             <a:r>
               <a:rPr lang="en-US" dirty="0" smtClean="0"/>
-              <a:t>)</a:t>
+              <a:t>Stacks</a:t>
+            </a:r>
+          </a:p>
+          <a:p>
+            <a:r>
+              <a:rPr lang="en-US" dirty="0"/>
+              <a:t>.NET Portable Class </a:t>
+            </a:r>
+            <a:r>
+              <a:rPr lang="en-US" dirty="0" smtClean="0"/>
+              <a:t>Library (PCL)</a:t>
+            </a:r>
+          </a:p>
+          <a:p>
+            <a:r>
+              <a:rPr lang="en-US" dirty="0"/>
+              <a:t>.NET Reunification </a:t>
+            </a:r>
+            <a:r>
+              <a:rPr lang="en-US" dirty="0" smtClean="0"/>
+              <a:t>Plan</a:t>
+            </a:r>
+          </a:p>
+          <a:p>
+            <a:r>
+              <a:rPr lang="en-US" dirty="0" smtClean="0"/>
+              <a:t>.</a:t>
+            </a:r>
+            <a:r>
+              <a:rPr lang="en-US" dirty="0"/>
+              <a:t>NET Stack </a:t>
+            </a:r>
+            <a:r>
+              <a:rPr lang="en-US" dirty="0" smtClean="0"/>
+              <a:t>Comparison</a:t>
+            </a:r>
+          </a:p>
+          <a:p>
+            <a:r>
+              <a:rPr lang="en-US" dirty="0"/>
+              <a:t>.NET </a:t>
+            </a:r>
+            <a:r>
+              <a:rPr lang="en-US" dirty="0" smtClean="0"/>
+              <a:t>Standard Base Class Library</a:t>
             </a:r>
           </a:p>
           <a:p>
             <a:r>
               <a:rPr lang="en-IN" dirty="0"/>
-              <a:t>.NET Compact Framework </a:t>
+              <a:t>.NET Standard </a:t>
+            </a:r>
+            <a:r>
+              <a:rPr lang="en-IN" dirty="0" smtClean="0"/>
+              <a:t>Versions</a:t>
+            </a:r>
+          </a:p>
+          <a:p>
+            <a:r>
+              <a:rPr lang="en-US" dirty="0" smtClean="0"/>
+              <a:t>Microsoft </a:t>
             </a:r>
             <a:r>
               <a:rPr lang="en-US" dirty="0"/>
-              <a:t>(Microsoft</a:t>
+              <a:t>Open Sourced </a:t>
             </a:r>
             <a:r>
               <a:rPr lang="en-US" dirty="0" smtClean="0"/>
-              <a:t>)</a:t>
-            </a:r>
-          </a:p>
-          <a:p>
+              <a:t>Technology</a:t>
+            </a:r>
+          </a:p>
+          <a:p>
+            <a:r>
+              <a:rPr lang="en-US" dirty="0" smtClean="0"/>
+              <a:t>.</a:t>
+            </a:r>
             <a:r>
               <a:rPr lang="en-US" dirty="0"/>
-              <a:t>Mono Project (</a:t>
+              <a:t>NET 5 A Unified </a:t>
+            </a:r>
+            <a:r>
+              <a:rPr lang="en-US" dirty="0" smtClean="0"/>
+              <a:t>Platform</a:t>
+            </a:r>
+          </a:p>
+          <a:p>
+            <a:r>
+              <a:rPr lang="en-US" dirty="0"/>
+              <a:t>Entity Framework Core </a:t>
             </a:r>
             <a:r>
               <a:rPr lang="en-IN" dirty="0"/>
-              <a:t>Ximian, Inc</a:t>
-            </a:r>
-            <a:r>
-              <a:rPr lang="en-IN" dirty="0" smtClean="0"/>
-              <a:t>.)</a:t>
-            </a:r>
-          </a:p>
-          <a:p>
-            <a:r>
-              <a:rPr lang="en-US" dirty="0"/>
-              <a:t>Xamarin Platform (Xamarin</a:t>
+              <a:t>(O/RM</a:t>
             </a:r>
             <a:r>
               <a:rPr lang="en-IN" dirty="0" smtClean="0"/>
@@ -4071,71 +4536,18 @@
           <a:p>
             <a:r>
               <a:rPr lang="en-US" dirty="0"/>
-              <a:t>.NET Core (Microsoft/OSS</a:t>
-            </a:r>
-            <a:r>
-              <a:rPr lang="en-US" dirty="0" smtClean="0"/>
-              <a:t>)</a:t>
-            </a:r>
-          </a:p>
-          <a:p>
-            <a:r>
-              <a:rPr lang="en-US" dirty="0"/>
-              <a:t>.Net Portable Class Library</a:t>
+              <a:t>The Windows UI Library (WinUI)</a:t>
             </a:r>
             <a:endParaRPr lang="en-US" dirty="0" smtClean="0"/>
           </a:p>
           <a:p>
             <a:r>
-              <a:rPr lang="en-US" dirty="0"/>
-              <a:t>.NET Stack </a:t>
-            </a:r>
-            <a:r>
-              <a:rPr lang="en-US" dirty="0" smtClean="0"/>
-              <a:t>Comparison</a:t>
-            </a:r>
-          </a:p>
-          <a:p>
-            <a:r>
-              <a:rPr lang="en-US" dirty="0"/>
-              <a:t>.NET </a:t>
-            </a:r>
-            <a:r>
-              <a:rPr lang="en-US" dirty="0" smtClean="0"/>
-              <a:t>Standard Base Class Library</a:t>
-            </a:r>
-          </a:p>
-          <a:p>
+              <a:rPr lang="en-IN" dirty="0" smtClean="0"/>
+              <a:t>.</a:t>
+            </a:r>
             <a:r>
               <a:rPr lang="en-IN" dirty="0"/>
-              <a:t>.NET Standard Versions</a:t>
-            </a:r>
-            <a:endParaRPr lang="en-US" dirty="0" smtClean="0"/>
-          </a:p>
-          <a:p>
-            <a:r>
-              <a:rPr lang="en-US" dirty="0"/>
-              <a:t>.NET Reunification </a:t>
-            </a:r>
-            <a:r>
-              <a:rPr lang="en-US" dirty="0" smtClean="0"/>
-              <a:t>Plan</a:t>
-            </a:r>
-          </a:p>
-          <a:p>
-            <a:r>
-              <a:rPr lang="en-US" dirty="0"/>
-              <a:t>.NET 5 A Unified </a:t>
-            </a:r>
-            <a:r>
-              <a:rPr lang="en-US" dirty="0" smtClean="0"/>
-              <a:t>Platform</a:t>
-            </a:r>
-          </a:p>
-          <a:p>
-            <a:r>
-              <a:rPr lang="en-IN" dirty="0"/>
-              <a:t>.NET Multi-platform App UI (MAUI</a:t>
+              <a:t>NET Multi-platform App UI (MAUI</a:t>
             </a:r>
             <a:r>
               <a:rPr lang="en-IN" dirty="0" smtClean="0"/>
@@ -4145,7 +4557,7 @@
           <a:p>
             <a:r>
               <a:rPr lang="en-US" dirty="0"/>
-              <a:t>Evolution of .Net </a:t>
+              <a:t>Evolution of .NET </a:t>
             </a:r>
             <a:r>
               <a:rPr lang="en-US" dirty="0" smtClean="0"/>
@@ -4155,12 +4567,16 @@
           <a:p>
             <a:r>
               <a:rPr lang="en-US" dirty="0"/>
-              <a:t>Microsoft Open Sourced </a:t>
-            </a:r>
-            <a:r>
-              <a:rPr lang="en-US" dirty="0" smtClean="0"/>
-              <a:t>Technology</a:t>
-            </a:r>
+              <a:t>Evolution of MS Development Technology</a:t>
+            </a:r>
+            <a:endParaRPr lang="en-IN" dirty="0" smtClean="0"/>
+          </a:p>
+          <a:p>
+            <a:r>
+              <a:rPr lang="en-US" dirty="0"/>
+              <a:t>Year 2020 – Technology in Focus</a:t>
+            </a:r>
+            <a:endParaRPr lang="en-US" dirty="0" smtClean="0"/>
           </a:p>
           <a:p>
             <a:r>
@@ -4223,8 +4639,12 @@
           <a:lstStyle/>
           <a:p>
             <a:r>
+              <a:rPr lang="en-US" dirty="0"/>
+              <a:t>Major .NET </a:t>
+            </a:r>
+            <a:r>
               <a:rPr lang="en-US" dirty="0" smtClean="0"/>
-              <a:t>.NET Framework (Microsoft)</a:t>
+              <a:t>Stacks</a:t>
             </a:r>
             <a:endParaRPr lang="en-IN" dirty="0"/>
           </a:p>
@@ -4254,11 +4674,267 @@
         </p:blipFill>
         <p:spPr>
           <a:xfrm>
-            <a:off x="1745750" y="1690688"/>
-            <a:ext cx="7714735" cy="4604732"/>
+            <a:off x="1636569" y="1690688"/>
+            <a:ext cx="3181024" cy="1898673"/>
           </a:xfrm>
         </p:spPr>
       </p:pic>
+      <p:pic>
+        <p:nvPicPr>
+          <p:cNvPr id="11" name="Picture 4"/>
+          <p:cNvPicPr>
+            <a:picLocks noChangeAspect="1" noChangeArrowheads="1"/>
+          </p:cNvPicPr>
+          <p:nvPr/>
+        </p:nvPicPr>
+        <p:blipFill>
+          <a:blip r:embed="rId3">
+            <a:extLst>
+              <a:ext uri="{28A0092B-C50C-407E-A947-70E740481C1C}">
+                <a14:useLocalDpi xmlns:a14="http://schemas.microsoft.com/office/drawing/2010/main" val="0"/>
+              </a:ext>
+            </a:extLst>
+          </a:blip>
+          <a:srcRect/>
+          <a:stretch>
+            <a:fillRect/>
+          </a:stretch>
+        </p:blipFill>
+        <p:spPr bwMode="auto">
+          <a:xfrm>
+            <a:off x="6719461" y="1690688"/>
+            <a:ext cx="3011393" cy="1907947"/>
+          </a:xfrm>
+          <a:prstGeom prst="rect">
+            <a:avLst/>
+          </a:prstGeom>
+          <a:noFill/>
+          <a:ln>
+            <a:noFill/>
+          </a:ln>
+          <a:extLst>
+            <a:ext uri="{909E8E84-426E-40DD-AFC4-6F175D3DCCD1}">
+              <a14:hiddenFill xmlns:a14="http://schemas.microsoft.com/office/drawing/2010/main">
+                <a:solidFill>
+                  <a:srgbClr val="FFFFFF"/>
+                </a:solidFill>
+              </a14:hiddenFill>
+            </a:ext>
+            <a:ext uri="{91240B29-F687-4F45-9708-019B960494DF}">
+              <a14:hiddenLine xmlns:a14="http://schemas.microsoft.com/office/drawing/2010/main" w="9525">
+                <a:solidFill>
+                  <a:srgbClr val="000000"/>
+                </a:solidFill>
+                <a:miter lim="800000"/>
+                <a:headEnd/>
+                <a:tailEnd/>
+              </a14:hiddenLine>
+            </a:ext>
+          </a:extLst>
+        </p:spPr>
+      </p:pic>
+      <p:pic>
+        <p:nvPicPr>
+          <p:cNvPr id="12" name="Picture 2" descr="Diagram of Mono architecture"/>
+          <p:cNvPicPr>
+            <a:picLocks noChangeAspect="1" noChangeArrowheads="1"/>
+          </p:cNvPicPr>
+          <p:nvPr/>
+        </p:nvPicPr>
+        <p:blipFill>
+          <a:blip r:embed="rId4" cstate="print">
+            <a:extLst>
+              <a:ext uri="{28A0092B-C50C-407E-A947-70E740481C1C}">
+                <a14:useLocalDpi xmlns:a14="http://schemas.microsoft.com/office/drawing/2010/main" val="0"/>
+              </a:ext>
+            </a:extLst>
+          </a:blip>
+          <a:srcRect/>
+          <a:stretch>
+            <a:fillRect/>
+          </a:stretch>
+        </p:blipFill>
+        <p:spPr bwMode="auto">
+          <a:xfrm>
+            <a:off x="1541001" y="4039579"/>
+            <a:ext cx="3372160" cy="2130653"/>
+          </a:xfrm>
+          <a:prstGeom prst="rect">
+            <a:avLst/>
+          </a:prstGeom>
+          <a:noFill/>
+          <a:extLst>
+            <a:ext uri="{909E8E84-426E-40DD-AFC4-6F175D3DCCD1}">
+              <a14:hiddenFill xmlns:a14="http://schemas.microsoft.com/office/drawing/2010/main">
+                <a:solidFill>
+                  <a:srgbClr val="FFFFFF"/>
+                </a:solidFill>
+              </a14:hiddenFill>
+            </a:ext>
+          </a:extLst>
+        </p:spPr>
+      </p:pic>
+      <p:pic>
+        <p:nvPicPr>
+          <p:cNvPr id="13" name="Content Placeholder 3"/>
+          <p:cNvPicPr>
+            <a:picLocks noChangeAspect="1"/>
+          </p:cNvPicPr>
+          <p:nvPr/>
+        </p:nvPicPr>
+        <p:blipFill>
+          <a:blip r:embed="rId5" cstate="print">
+            <a:extLst>
+              <a:ext uri="{28A0092B-C50C-407E-A947-70E740481C1C}">
+                <a14:useLocalDpi xmlns:a14="http://schemas.microsoft.com/office/drawing/2010/main" val="0"/>
+              </a:ext>
+            </a:extLst>
+          </a:blip>
+          <a:stretch>
+            <a:fillRect/>
+          </a:stretch>
+        </p:blipFill>
+        <p:spPr>
+          <a:xfrm>
+            <a:off x="6201307" y="4258621"/>
+            <a:ext cx="3742545" cy="1692567"/>
+          </a:xfrm>
+          <a:prstGeom prst="rect">
+            <a:avLst/>
+          </a:prstGeom>
+        </p:spPr>
+      </p:pic>
+      <p:sp>
+        <p:nvSpPr>
+          <p:cNvPr id="5" name="Rectangle 4"/>
+          <p:cNvSpPr/>
+          <p:nvPr/>
+        </p:nvSpPr>
+        <p:spPr>
+          <a:xfrm>
+            <a:off x="6394329" y="3670247"/>
+            <a:ext cx="3717171" cy="369332"/>
+          </a:xfrm>
+          <a:prstGeom prst="rect">
+            <a:avLst/>
+          </a:prstGeom>
+        </p:spPr>
+        <p:txBody>
+          <a:bodyPr wrap="none">
+            <a:spAutoFit/>
+          </a:bodyPr>
+          <a:lstStyle/>
+          <a:p>
+            <a:r>
+              <a:rPr lang="en-IN" dirty="0"/>
+              <a:t>.NET Compact Framework </a:t>
+            </a:r>
+            <a:r>
+              <a:rPr lang="en-US" dirty="0"/>
+              <a:t>(Microsoft)</a:t>
+            </a:r>
+            <a:endParaRPr lang="en-IN" dirty="0"/>
+          </a:p>
+        </p:txBody>
+      </p:sp>
+      <p:sp>
+        <p:nvSpPr>
+          <p:cNvPr id="14" name="Rectangle 13"/>
+          <p:cNvSpPr/>
+          <p:nvPr/>
+        </p:nvSpPr>
+        <p:spPr>
+          <a:xfrm>
+            <a:off x="1786065" y="3623931"/>
+            <a:ext cx="2827505" cy="369332"/>
+          </a:xfrm>
+          <a:prstGeom prst="rect">
+            <a:avLst/>
+          </a:prstGeom>
+        </p:spPr>
+        <p:txBody>
+          <a:bodyPr wrap="none">
+            <a:spAutoFit/>
+          </a:bodyPr>
+          <a:lstStyle/>
+          <a:p>
+            <a:r>
+              <a:rPr lang="en-US" dirty="0"/>
+              <a:t>.NET Framework (Microsoft)</a:t>
+            </a:r>
+            <a:endParaRPr lang="en-IN" dirty="0"/>
+          </a:p>
+        </p:txBody>
+      </p:sp>
+      <p:sp>
+        <p:nvSpPr>
+          <p:cNvPr id="15" name="Rectangle 14"/>
+          <p:cNvSpPr/>
+          <p:nvPr/>
+        </p:nvSpPr>
+        <p:spPr>
+          <a:xfrm>
+            <a:off x="1855006" y="6170232"/>
+            <a:ext cx="2744149" cy="369332"/>
+          </a:xfrm>
+          <a:prstGeom prst="rect">
+            <a:avLst/>
+          </a:prstGeom>
+        </p:spPr>
+        <p:txBody>
+          <a:bodyPr wrap="none">
+            <a:spAutoFit/>
+          </a:bodyPr>
+          <a:lstStyle/>
+          <a:p>
+            <a:r>
+              <a:rPr lang="en-US" dirty="0"/>
+              <a:t>Mono Project (</a:t>
+            </a:r>
+            <a:r>
+              <a:rPr lang="en-IN" dirty="0"/>
+              <a:t>Ximian, Inc.)</a:t>
+            </a:r>
+          </a:p>
+        </p:txBody>
+      </p:sp>
+      <p:sp>
+        <p:nvSpPr>
+          <p:cNvPr id="16" name="Rectangle 15"/>
+          <p:cNvSpPr/>
+          <p:nvPr/>
+        </p:nvSpPr>
+        <p:spPr>
+          <a:xfrm>
+            <a:off x="6797811" y="6005966"/>
+            <a:ext cx="2854692" cy="369332"/>
+          </a:xfrm>
+          <a:prstGeom prst="rect">
+            <a:avLst/>
+          </a:prstGeom>
+        </p:spPr>
+        <p:txBody>
+          <a:bodyPr wrap="none">
+            <a:spAutoFit/>
+          </a:bodyPr>
+          <a:lstStyle/>
+          <a:p>
+            <a:r>
+              <a:rPr lang="en-US" dirty="0"/>
+              <a:t>Xamarin Platform (Xamarin</a:t>
+            </a:r>
+            <a:r>
+              <a:rPr lang="en-IN" dirty="0"/>
+              <a:t>)</a:t>
+            </a:r>
+            <a:r>
+              <a:rPr lang="en-US" dirty="0"/>
+              <a:t> </a:t>
+            </a:r>
+            <a:endParaRPr lang="en-IN" dirty="0"/>
+          </a:p>
+        </p:txBody>
+      </p:sp>
     </p:spTree>
     <p:extLst>
       <p:ext uri="{BB962C8B-B14F-4D97-AF65-F5344CB8AC3E}">
@@ -4312,16 +4988,8 @@
           <a:lstStyle/>
           <a:p>
             <a:r>
-              <a:rPr lang="en-IN" dirty="0"/>
-              <a:t>.NET Compact </a:t>
-            </a:r>
-            <a:r>
-              <a:rPr lang="en-IN" dirty="0" smtClean="0"/>
-              <a:t>Framework </a:t>
-            </a:r>
-            <a:r>
-              <a:rPr lang="en-US" dirty="0"/>
-              <a:t>(Microsoft)</a:t>
+              <a:rPr lang="en-US" dirty="0" smtClean="0"/>
+              <a:t>.NET Portable Class Library (PCL)</a:t>
             </a:r>
             <a:endParaRPr lang="en-IN" dirty="0"/>
           </a:p>
@@ -4329,62 +4997,95 @@
       </p:sp>
       <p:pic>
         <p:nvPicPr>
-          <p:cNvPr id="1028" name="Picture 4"/>
+          <p:cNvPr id="4" name="Content Placeholder 3"/>
           <p:cNvPicPr>
-            <a:picLocks noChangeAspect="1" noChangeArrowheads="1"/>
+            <a:picLocks noGrp="1" noChangeAspect="1"/>
           </p:cNvPicPr>
-          <p:nvPr/>
+          <p:nvPr>
+            <p:ph idx="1"/>
+          </p:nvPr>
         </p:nvPicPr>
         <p:blipFill>
-          <a:blip r:embed="rId2">
-            <a:extLst>
-              <a:ext uri="{28A0092B-C50C-407E-A947-70E740481C1C}">
-                <a14:useLocalDpi xmlns:a14="http://schemas.microsoft.com/office/drawing/2010/main" val="0"/>
-              </a:ext>
-            </a:extLst>
-          </a:blip>
-          <a:srcRect/>
+          <a:blip r:embed="rId2"/>
           <a:stretch>
             <a:fillRect/>
           </a:stretch>
         </p:blipFill>
-        <p:spPr bwMode="auto">
+        <p:spPr>
           <a:xfrm>
-            <a:off x="1888154" y="1690688"/>
-            <a:ext cx="7446916" cy="4718191"/>
+            <a:off x="1429061" y="1969032"/>
+            <a:ext cx="8056134" cy="3971334"/>
           </a:xfrm>
           <a:prstGeom prst="rect">
             <a:avLst/>
           </a:prstGeom>
-          <a:noFill/>
-          <a:ln>
-            <a:noFill/>
-          </a:ln>
-          <a:extLst>
-            <a:ext uri="{909E8E84-426E-40DD-AFC4-6F175D3DCCD1}">
-              <a14:hiddenFill xmlns:a14="http://schemas.microsoft.com/office/drawing/2010/main">
-                <a:solidFill>
-                  <a:srgbClr val="FFFFFF"/>
-                </a:solidFill>
-              </a14:hiddenFill>
-            </a:ext>
-            <a:ext uri="{91240B29-F687-4F45-9708-019B960494DF}">
-              <a14:hiddenLine xmlns:a14="http://schemas.microsoft.com/office/drawing/2010/main" w="9525">
+        </p:spPr>
+      </p:pic>
+      <p:sp>
+        <p:nvSpPr>
+          <p:cNvPr id="3" name="Rectangle 2"/>
+          <p:cNvSpPr/>
+          <p:nvPr/>
+        </p:nvSpPr>
+        <p:spPr>
+          <a:xfrm>
+            <a:off x="1504124" y="5957604"/>
+            <a:ext cx="7981071" cy="923330"/>
+          </a:xfrm>
+          <a:prstGeom prst="rect">
+            <a:avLst/>
+          </a:prstGeom>
+        </p:spPr>
+        <p:txBody>
+          <a:bodyPr wrap="square">
+            <a:spAutoFit/>
+          </a:bodyPr>
+          <a:lstStyle/>
+          <a:p>
+            <a:r>
+              <a:rPr lang="en-IN" dirty="0">
                 <a:solidFill>
                   <a:srgbClr val="000000"/>
                 </a:solidFill>
-                <a:miter lim="800000"/>
-                <a:headEnd/>
-                <a:tailEnd/>
-              </a14:hiddenLine>
-            </a:ext>
-          </a:extLst>
-        </p:spPr>
-      </p:pic>
+                <a:latin typeface="Arial" panose="020B0604020202020204" pitchFamily="34" charset="0"/>
+              </a:rPr>
+              <a:t>The Portable Class Library project enables </a:t>
+            </a:r>
+            <a:r>
+              <a:rPr lang="en-IN" dirty="0" smtClean="0">
+                <a:solidFill>
+                  <a:srgbClr val="000000"/>
+                </a:solidFill>
+                <a:latin typeface="Arial" panose="020B0604020202020204" pitchFamily="34" charset="0"/>
+              </a:rPr>
+              <a:t>to </a:t>
+            </a:r>
+            <a:r>
+              <a:rPr lang="en-IN" dirty="0">
+                <a:solidFill>
+                  <a:srgbClr val="000000"/>
+                </a:solidFill>
+                <a:latin typeface="Arial" panose="020B0604020202020204" pitchFamily="34" charset="0"/>
+              </a:rPr>
+              <a:t>write and build managed assemblies that work on more than one </a:t>
+            </a:r>
+            <a:r>
+              <a:rPr lang="en-IN" dirty="0" smtClean="0">
+                <a:solidFill>
+                  <a:srgbClr val="000000"/>
+                </a:solidFill>
+                <a:latin typeface="Arial" panose="020B0604020202020204" pitchFamily="34" charset="0"/>
+              </a:rPr>
+              <a:t>Microsoft platforms such as Windows, Windows Phone etc.</a:t>
+            </a:r>
+            <a:endParaRPr lang="en-IN" dirty="0"/>
+          </a:p>
+        </p:txBody>
+      </p:sp>
     </p:spTree>
     <p:extLst>
       <p:ext uri="{BB962C8B-B14F-4D97-AF65-F5344CB8AC3E}">
-        <p14:creationId xmlns:p14="http://schemas.microsoft.com/office/powerpoint/2010/main" val="2216275539"/>
+        <p14:creationId xmlns:p14="http://schemas.microsoft.com/office/powerpoint/2010/main" val="247739105"/>
       </p:ext>
     </p:extLst>
   </p:cSld>
@@ -4435,15 +5136,7 @@
           <a:p>
             <a:r>
               <a:rPr lang="en-US" dirty="0" smtClean="0"/>
-              <a:t>Mono Project (</a:t>
-            </a:r>
-            <a:r>
-              <a:rPr lang="en-IN" dirty="0"/>
-              <a:t>Ximian, Inc</a:t>
-            </a:r>
-            <a:r>
-              <a:rPr lang="en-IN" dirty="0" smtClean="0"/>
-              <a:t>.)</a:t>
+              <a:t>.NET Reunification Plan</a:t>
             </a:r>
             <a:endParaRPr lang="en-IN" dirty="0"/>
           </a:p>
@@ -4451,7 +5144,7 @@
       </p:sp>
       <p:pic>
         <p:nvPicPr>
-          <p:cNvPr id="1026" name="Picture 2" descr="Diagram of Mono architecture"/>
+          <p:cNvPr id="1026" name="Picture 2" descr="dotnet-timeline.png"/>
           <p:cNvPicPr>
             <a:picLocks noGrp="1" noChangeAspect="1" noChangeArrowheads="1"/>
           </p:cNvPicPr>
@@ -4474,8 +5167,8 @@
         </p:blipFill>
         <p:spPr bwMode="auto">
           <a:xfrm>
-            <a:off x="1451588" y="1731632"/>
-            <a:ext cx="8178249" cy="5167312"/>
+            <a:off x="1219353" y="1690689"/>
+            <a:ext cx="8156659" cy="4355498"/>
           </a:xfrm>
           <a:prstGeom prst="rect">
             <a:avLst/>
@@ -4495,7 +5188,7 @@
     </p:spTree>
     <p:extLst>
       <p:ext uri="{BB962C8B-B14F-4D97-AF65-F5344CB8AC3E}">
-        <p14:creationId xmlns:p14="http://schemas.microsoft.com/office/powerpoint/2010/main" val="988191662"/>
+        <p14:creationId xmlns:p14="http://schemas.microsoft.com/office/powerpoint/2010/main" val="3315123049"/>
       </p:ext>
     </p:extLst>
   </p:cSld>
@@ -4546,15 +5239,7 @@
           <a:p>
             <a:r>
               <a:rPr lang="en-US" dirty="0" smtClean="0"/>
-              <a:t>Xamarin Platform (Xamarin</a:t>
-            </a:r>
-            <a:r>
-              <a:rPr lang="en-IN" dirty="0" smtClean="0"/>
-              <a:t>)</a:t>
-            </a:r>
-            <a:r>
-              <a:rPr lang="en-US" dirty="0" smtClean="0"/>
-              <a:t> </a:t>
+              <a:t>.NET Stack Comparison</a:t>
             </a:r>
             <a:endParaRPr lang="en-IN" dirty="0"/>
           </a:p>
@@ -4571,28 +5256,25 @@
           </p:nvPr>
         </p:nvPicPr>
         <p:blipFill>
-          <a:blip r:embed="rId2">
-            <a:extLst>
-              <a:ext uri="{28A0092B-C50C-407E-A947-70E740481C1C}">
-                <a14:useLocalDpi xmlns:a14="http://schemas.microsoft.com/office/drawing/2010/main" val="0"/>
-              </a:ext>
-            </a:extLst>
-          </a:blip>
+          <a:blip r:embed="rId2"/>
           <a:stretch>
             <a:fillRect/>
           </a:stretch>
         </p:blipFill>
         <p:spPr>
           <a:xfrm>
-            <a:off x="838200" y="1928179"/>
-            <a:ext cx="8676190" cy="3923809"/>
+            <a:off x="1410108" y="1825625"/>
+            <a:ext cx="8320744" cy="4765518"/>
           </a:xfrm>
+          <a:prstGeom prst="rect">
+            <a:avLst/>
+          </a:prstGeom>
         </p:spPr>
       </p:pic>
     </p:spTree>
     <p:extLst>
       <p:ext uri="{BB962C8B-B14F-4D97-AF65-F5344CB8AC3E}">
-        <p14:creationId xmlns:p14="http://schemas.microsoft.com/office/powerpoint/2010/main" val="2065127330"/>
+        <p14:creationId xmlns:p14="http://schemas.microsoft.com/office/powerpoint/2010/main" val="1331523465"/>
       </p:ext>
     </p:extLst>
   </p:cSld>
@@ -4642,8 +5324,20 @@
           <a:lstStyle/>
           <a:p>
             <a:r>
+              <a:rPr lang="en-US" dirty="0"/>
+              <a:t>.</a:t>
+            </a:r>
+            <a:r>
               <a:rPr lang="en-US" dirty="0" smtClean="0"/>
-              <a:t>.NET Core (Microsoft/OSS)</a:t>
+              <a:t>NET </a:t>
+            </a:r>
+            <a:r>
+              <a:rPr lang="en-US" dirty="0"/>
+              <a:t>Standard Base Class </a:t>
+            </a:r>
+            <a:r>
+              <a:rPr lang="en-US" dirty="0" smtClean="0"/>
+              <a:t>Library</a:t>
             </a:r>
             <a:endParaRPr lang="en-IN" dirty="0"/>
           </a:p>
@@ -4660,28 +5354,25 @@
           </p:nvPr>
         </p:nvPicPr>
         <p:blipFill>
-          <a:blip r:embed="rId2">
-            <a:extLst>
-              <a:ext uri="{28A0092B-C50C-407E-A947-70E740481C1C}">
-                <a14:useLocalDpi xmlns:a14="http://schemas.microsoft.com/office/drawing/2010/main" val="0"/>
-              </a:ext>
-            </a:extLst>
-          </a:blip>
+          <a:blip r:embed="rId2"/>
           <a:stretch>
             <a:fillRect/>
           </a:stretch>
         </p:blipFill>
         <p:spPr>
           <a:xfrm>
-            <a:off x="1792837" y="1690687"/>
-            <a:ext cx="6881605" cy="4861317"/>
+            <a:off x="1376314" y="1825625"/>
+            <a:ext cx="8431677" cy="4698744"/>
           </a:xfrm>
+          <a:prstGeom prst="rect">
+            <a:avLst/>
+          </a:prstGeom>
         </p:spPr>
       </p:pic>
     </p:spTree>
     <p:extLst>
       <p:ext uri="{BB962C8B-B14F-4D97-AF65-F5344CB8AC3E}">
-        <p14:creationId xmlns:p14="http://schemas.microsoft.com/office/powerpoint/2010/main" val="3176660911"/>
+        <p14:creationId xmlns:p14="http://schemas.microsoft.com/office/powerpoint/2010/main" val="2219760803"/>
       </p:ext>
     </p:extLst>
   </p:cSld>
@@ -4731,8 +5422,12 @@
           <a:lstStyle/>
           <a:p>
             <a:r>
-              <a:rPr lang="en-US" dirty="0" smtClean="0"/>
-              <a:t>.Net Portable Class Library</a:t>
+              <a:rPr lang="en-IN" b="1" dirty="0"/>
+              <a:t>.</a:t>
+            </a:r>
+            <a:r>
+              <a:rPr lang="en-IN" b="1" dirty="0" smtClean="0"/>
+              <a:t>NET Standard Versions</a:t>
             </a:r>
             <a:endParaRPr lang="en-IN" dirty="0"/>
           </a:p>
@@ -4740,7 +5435,7 @@
       </p:sp>
       <p:pic>
         <p:nvPicPr>
-          <p:cNvPr id="4" name="Content Placeholder 3"/>
+          <p:cNvPr id="8" name="Content Placeholder 7"/>
           <p:cNvPicPr>
             <a:picLocks noGrp="1" noChangeAspect="1"/>
           </p:cNvPicPr>
@@ -4756,8 +5451,8 @@
         </p:blipFill>
         <p:spPr>
           <a:xfrm>
-            <a:off x="1429060" y="1969031"/>
-            <a:ext cx="8438271" cy="4159711"/>
+            <a:off x="1342883" y="2209302"/>
+            <a:ext cx="8429570" cy="3468166"/>
           </a:xfrm>
           <a:prstGeom prst="rect">
             <a:avLst/>
@@ -4767,13 +5462,20 @@
     </p:spTree>
     <p:extLst>
       <p:ext uri="{BB962C8B-B14F-4D97-AF65-F5344CB8AC3E}">
-        <p14:creationId xmlns:p14="http://schemas.microsoft.com/office/powerpoint/2010/main" val="247739105"/>
+        <p14:creationId xmlns:p14="http://schemas.microsoft.com/office/powerpoint/2010/main" val="4223069382"/>
       </p:ext>
     </p:extLst>
   </p:cSld>
   <p:clrMapOvr>
     <a:masterClrMapping/>
   </p:clrMapOvr>
+  <p:timing>
+    <p:tnLst>
+      <p:par>
+        <p:cTn id="1" dur="indefinite" restart="never" nodeType="tmRoot"/>
+      </p:par>
+    </p:tnLst>
+  </p:timing>
 </p:sld>
 </file>
 
@@ -4810,43 +5512,1011 @@
           <a:lstStyle/>
           <a:p>
             <a:r>
-              <a:rPr lang="en-US" dirty="0" smtClean="0"/>
-              <a:t>.NET Stack Comparison</a:t>
+              <a:rPr lang="en-US" dirty="0"/>
+              <a:t>Microsoft Open Sourced Technology</a:t>
             </a:r>
             <a:endParaRPr lang="en-IN" dirty="0"/>
           </a:p>
         </p:txBody>
       </p:sp>
-      <p:pic>
-        <p:nvPicPr>
-          <p:cNvPr id="4" name="Content Placeholder 3"/>
-          <p:cNvPicPr>
-            <a:picLocks noGrp="1" noChangeAspect="1"/>
-          </p:cNvPicPr>
+      <p:sp>
+        <p:nvSpPr>
+          <p:cNvPr id="3" name="Content Placeholder 2"/>
+          <p:cNvSpPr>
+            <a:spLocks noGrp="1"/>
+          </p:cNvSpPr>
           <p:nvPr>
             <p:ph idx="1"/>
           </p:nvPr>
-        </p:nvPicPr>
-        <p:blipFill>
-          <a:blip r:embed="rId2"/>
-          <a:stretch>
-            <a:fillRect/>
-          </a:stretch>
-        </p:blipFill>
-        <p:spPr>
-          <a:xfrm>
-            <a:off x="1491996" y="1825625"/>
-            <a:ext cx="8320744" cy="4765518"/>
-          </a:xfrm>
-          <a:prstGeom prst="rect">
-            <a:avLst/>
-          </a:prstGeom>
-        </p:spPr>
-      </p:pic>
+        </p:nvSpPr>
+        <p:spPr/>
+        <p:txBody>
+          <a:bodyPr/>
+          <a:lstStyle/>
+          <a:p>
+            <a:endParaRPr lang="en-IN" dirty="0"/>
+          </a:p>
+          <a:p>
+            <a:endParaRPr lang="en-IN" dirty="0"/>
+          </a:p>
+        </p:txBody>
+      </p:sp>
+      <p:graphicFrame>
+        <p:nvGraphicFramePr>
+          <p:cNvPr id="4" name="Table 3"/>
+          <p:cNvGraphicFramePr>
+            <a:graphicFrameLocks noGrp="1"/>
+          </p:cNvGraphicFramePr>
+          <p:nvPr>
+            <p:extLst>
+              <p:ext uri="{D42A27DB-BD31-4B8C-83A1-F6EECF244321}">
+                <p14:modId xmlns:p14="http://schemas.microsoft.com/office/powerpoint/2010/main" val="3674912090"/>
+              </p:ext>
+            </p:extLst>
+          </p:nvPr>
+        </p:nvGraphicFramePr>
+        <p:xfrm>
+          <a:off x="1328761" y="1690688"/>
+          <a:ext cx="8675049" cy="4596233"/>
+        </p:xfrm>
+        <a:graphic>
+          <a:graphicData uri="http://schemas.openxmlformats.org/drawingml/2006/table">
+            <a:tbl>
+              <a:tblPr firstRow="1" bandRow="1">
+                <a:tableStyleId>{5C22544A-7EE6-4342-B048-85BDC9FD1C3A}</a:tableStyleId>
+              </a:tblPr>
+              <a:tblGrid>
+                <a:gridCol w="1509973"/>
+                <a:gridCol w="3138985"/>
+                <a:gridCol w="4026091"/>
+              </a:tblGrid>
+              <a:tr h="357339">
+                <a:tc>
+                  <a:txBody>
+                    <a:bodyPr/>
+                    <a:lstStyle/>
+                    <a:p>
+                      <a:r>
+                        <a:rPr lang="en-US" dirty="0" smtClean="0"/>
+                        <a:t>Technology</a:t>
+                      </a:r>
+                      <a:endParaRPr lang="en-IN" dirty="0"/>
+                    </a:p>
+                  </a:txBody>
+                  <a:tcPr/>
+                </a:tc>
+                <a:tc>
+                  <a:txBody>
+                    <a:bodyPr/>
+                    <a:lstStyle/>
+                    <a:p>
+                      <a:r>
+                        <a:rPr lang="en-US" dirty="0" smtClean="0"/>
+                        <a:t>Platform</a:t>
+                      </a:r>
+                      <a:endParaRPr lang="en-IN" dirty="0"/>
+                    </a:p>
+                  </a:txBody>
+                  <a:tcPr/>
+                </a:tc>
+                <a:tc>
+                  <a:txBody>
+                    <a:bodyPr/>
+                    <a:lstStyle/>
+                    <a:p>
+                      <a:r>
+                        <a:rPr lang="en-US" dirty="0" smtClean="0"/>
+                        <a:t>Project Home</a:t>
+                      </a:r>
+                      <a:endParaRPr lang="en-IN" dirty="0"/>
+                    </a:p>
+                  </a:txBody>
+                  <a:tcPr/>
+                </a:tc>
+              </a:tr>
+              <a:tr h="357339">
+                <a:tc>
+                  <a:txBody>
+                    <a:bodyPr/>
+                    <a:lstStyle/>
+                    <a:p>
+                      <a:pPr marL="0" marR="0" lvl="0" indent="0" algn="l" defTabSz="914400" rtl="0" eaLnBrk="1" fontAlgn="auto" latinLnBrk="0" hangingPunct="1">
+                        <a:lnSpc>
+                          <a:spcPct val="100000"/>
+                        </a:lnSpc>
+                        <a:spcBef>
+                          <a:spcPts val="0"/>
+                        </a:spcBef>
+                        <a:spcAft>
+                          <a:spcPts val="0"/>
+                        </a:spcAft>
+                        <a:buClrTx/>
+                        <a:buSzTx/>
+                        <a:buFontTx/>
+                        <a:buNone/>
+                        <a:tabLst/>
+                        <a:defRPr/>
+                      </a:pPr>
+                      <a:r>
+                        <a:rPr lang="en-US" dirty="0" smtClean="0"/>
+                        <a:t>.Net Core</a:t>
+                      </a:r>
+                    </a:p>
+                  </a:txBody>
+                  <a:tcPr/>
+                </a:tc>
+                <a:tc>
+                  <a:txBody>
+                    <a:bodyPr/>
+                    <a:lstStyle/>
+                    <a:p>
+                      <a:pPr marL="0" marR="0" lvl="0" indent="0" algn="l" defTabSz="914400" rtl="0" eaLnBrk="1" fontAlgn="auto" latinLnBrk="0" hangingPunct="1">
+                        <a:lnSpc>
+                          <a:spcPct val="100000"/>
+                        </a:lnSpc>
+                        <a:spcBef>
+                          <a:spcPts val="0"/>
+                        </a:spcBef>
+                        <a:spcAft>
+                          <a:spcPts val="0"/>
+                        </a:spcAft>
+                        <a:buClrTx/>
+                        <a:buSzTx/>
+                        <a:buFontTx/>
+                        <a:buNone/>
+                        <a:tabLst/>
+                        <a:defRPr/>
+                      </a:pPr>
+                      <a:r>
+                        <a:rPr lang="en-US" dirty="0" smtClean="0"/>
+                        <a:t>Windows, Linux, macOS</a:t>
+                      </a:r>
+                    </a:p>
+                  </a:txBody>
+                  <a:tcPr/>
+                </a:tc>
+                <a:tc>
+                  <a:txBody>
+                    <a:bodyPr/>
+                    <a:lstStyle/>
+                    <a:p>
+                      <a:pPr marL="0" marR="0" lvl="0" indent="0" algn="l" defTabSz="914400" rtl="0" eaLnBrk="1" fontAlgn="auto" latinLnBrk="0" hangingPunct="1">
+                        <a:lnSpc>
+                          <a:spcPct val="100000"/>
+                        </a:lnSpc>
+                        <a:spcBef>
+                          <a:spcPts val="0"/>
+                        </a:spcBef>
+                        <a:spcAft>
+                          <a:spcPts val="0"/>
+                        </a:spcAft>
+                        <a:buClrTx/>
+                        <a:buSzTx/>
+                        <a:buFontTx/>
+                        <a:buNone/>
+                        <a:tabLst/>
+                        <a:defRPr/>
+                      </a:pPr>
+                      <a:r>
+                        <a:rPr lang="en-IN" dirty="0" smtClean="0">
+                          <a:hlinkClick r:id="rId2"/>
+                        </a:rPr>
+                        <a:t>https://github.com/dotnet/core</a:t>
+                      </a:r>
+                      <a:endParaRPr lang="en-IN" dirty="0" smtClean="0"/>
+                    </a:p>
+                  </a:txBody>
+                  <a:tcPr/>
+                </a:tc>
+              </a:tr>
+              <a:tr h="566112">
+                <a:tc>
+                  <a:txBody>
+                    <a:bodyPr/>
+                    <a:lstStyle/>
+                    <a:p>
+                      <a:pPr marL="0" marR="0" lvl="0" indent="0" algn="l" defTabSz="914400" rtl="0" eaLnBrk="1" fontAlgn="auto" latinLnBrk="0" hangingPunct="1">
+                        <a:lnSpc>
+                          <a:spcPct val="100000"/>
+                        </a:lnSpc>
+                        <a:spcBef>
+                          <a:spcPts val="0"/>
+                        </a:spcBef>
+                        <a:spcAft>
+                          <a:spcPts val="0"/>
+                        </a:spcAft>
+                        <a:buClrTx/>
+                        <a:buSzTx/>
+                        <a:buFontTx/>
+                        <a:buNone/>
+                        <a:tabLst/>
+                        <a:defRPr/>
+                      </a:pPr>
+                      <a:r>
+                        <a:rPr lang="en-US" dirty="0" smtClean="0"/>
+                        <a:t>WinForms</a:t>
+                      </a:r>
+                    </a:p>
+                    <a:p>
+                      <a:pPr marL="0" marR="0" lvl="0" indent="0" algn="l" defTabSz="914400" rtl="0" eaLnBrk="1" fontAlgn="auto" latinLnBrk="0" hangingPunct="1">
+                        <a:lnSpc>
+                          <a:spcPct val="100000"/>
+                        </a:lnSpc>
+                        <a:spcBef>
+                          <a:spcPts val="0"/>
+                        </a:spcBef>
+                        <a:spcAft>
+                          <a:spcPts val="0"/>
+                        </a:spcAft>
+                        <a:buClrTx/>
+                        <a:buSzTx/>
+                        <a:buFontTx/>
+                        <a:buNone/>
+                        <a:tabLst/>
+                        <a:defRPr/>
+                      </a:pPr>
+                      <a:r>
+                        <a:rPr lang="en-US" dirty="0" smtClean="0"/>
+                        <a:t>Feb/2002</a:t>
+                      </a:r>
+                    </a:p>
+                  </a:txBody>
+                  <a:tcPr/>
+                </a:tc>
+                <a:tc>
+                  <a:txBody>
+                    <a:bodyPr/>
+                    <a:lstStyle/>
+                    <a:p>
+                      <a:pPr marL="0" marR="0" lvl="0" indent="0" algn="l" defTabSz="914400" rtl="0" eaLnBrk="1" fontAlgn="auto" latinLnBrk="0" hangingPunct="1">
+                        <a:lnSpc>
+                          <a:spcPct val="100000"/>
+                        </a:lnSpc>
+                        <a:spcBef>
+                          <a:spcPts val="0"/>
+                        </a:spcBef>
+                        <a:spcAft>
+                          <a:spcPts val="0"/>
+                        </a:spcAft>
+                        <a:buClrTx/>
+                        <a:buSzTx/>
+                        <a:buFontTx/>
+                        <a:buNone/>
+                        <a:tabLst/>
+                        <a:defRPr/>
+                      </a:pPr>
+                      <a:r>
+                        <a:rPr lang="en-US" dirty="0" smtClean="0"/>
+                        <a:t>Windows Desktop</a:t>
+                      </a:r>
+                    </a:p>
+                    <a:p>
+                      <a:pPr marL="0" marR="0" lvl="0" indent="0" algn="l" defTabSz="914400" rtl="0" eaLnBrk="1" fontAlgn="auto" latinLnBrk="0" hangingPunct="1">
+                        <a:lnSpc>
+                          <a:spcPct val="100000"/>
+                        </a:lnSpc>
+                        <a:spcBef>
+                          <a:spcPts val="0"/>
+                        </a:spcBef>
+                        <a:spcAft>
+                          <a:spcPts val="0"/>
+                        </a:spcAft>
+                        <a:buClrTx/>
+                        <a:buSzTx/>
+                        <a:buFontTx/>
+                        <a:buNone/>
+                        <a:tabLst/>
+                        <a:defRPr/>
+                      </a:pPr>
+                      <a:r>
+                        <a:rPr lang="en-US" dirty="0" smtClean="0"/>
+                        <a:t>(.Net Fx 1.x)</a:t>
+                      </a:r>
+                    </a:p>
+                  </a:txBody>
+                  <a:tcPr/>
+                </a:tc>
+                <a:tc>
+                  <a:txBody>
+                    <a:bodyPr/>
+                    <a:lstStyle/>
+                    <a:p>
+                      <a:pPr marL="0" marR="0" lvl="0" indent="0" algn="l" defTabSz="914400" rtl="0" eaLnBrk="1" fontAlgn="auto" latinLnBrk="0" hangingPunct="1">
+                        <a:lnSpc>
+                          <a:spcPct val="100000"/>
+                        </a:lnSpc>
+                        <a:spcBef>
+                          <a:spcPts val="0"/>
+                        </a:spcBef>
+                        <a:spcAft>
+                          <a:spcPts val="0"/>
+                        </a:spcAft>
+                        <a:buClrTx/>
+                        <a:buSzTx/>
+                        <a:buFontTx/>
+                        <a:buNone/>
+                        <a:tabLst/>
+                        <a:defRPr/>
+                      </a:pPr>
+                      <a:r>
+                        <a:rPr lang="en-IN" dirty="0" smtClean="0">
+                          <a:hlinkClick r:id="rId3"/>
+                        </a:rPr>
+                        <a:t>https://github.com/dotnet/winforms</a:t>
+                      </a:r>
+                      <a:endParaRPr lang="en-IN" dirty="0" smtClean="0"/>
+                    </a:p>
+                  </a:txBody>
+                  <a:tcPr/>
+                </a:tc>
+              </a:tr>
+              <a:tr h="566112">
+                <a:tc>
+                  <a:txBody>
+                    <a:bodyPr/>
+                    <a:lstStyle/>
+                    <a:p>
+                      <a:pPr marL="0" marR="0" lvl="0" indent="0" algn="l" defTabSz="914400" rtl="0" eaLnBrk="1" fontAlgn="auto" latinLnBrk="0" hangingPunct="1">
+                        <a:lnSpc>
+                          <a:spcPct val="100000"/>
+                        </a:lnSpc>
+                        <a:spcBef>
+                          <a:spcPts val="0"/>
+                        </a:spcBef>
+                        <a:spcAft>
+                          <a:spcPts val="0"/>
+                        </a:spcAft>
+                        <a:buClrTx/>
+                        <a:buSzTx/>
+                        <a:buFontTx/>
+                        <a:buNone/>
+                        <a:tabLst/>
+                        <a:defRPr/>
+                      </a:pPr>
+                      <a:r>
+                        <a:rPr lang="en-US" dirty="0" smtClean="0"/>
+                        <a:t>WPF</a:t>
+                      </a:r>
+                    </a:p>
+                    <a:p>
+                      <a:pPr marL="0" marR="0" lvl="0" indent="0" algn="l" defTabSz="914400" rtl="0" eaLnBrk="1" fontAlgn="auto" latinLnBrk="0" hangingPunct="1">
+                        <a:lnSpc>
+                          <a:spcPct val="100000"/>
+                        </a:lnSpc>
+                        <a:spcBef>
+                          <a:spcPts val="0"/>
+                        </a:spcBef>
+                        <a:spcAft>
+                          <a:spcPts val="0"/>
+                        </a:spcAft>
+                        <a:buClrTx/>
+                        <a:buSzTx/>
+                        <a:buFontTx/>
+                        <a:buNone/>
+                        <a:tabLst/>
+                        <a:defRPr/>
+                      </a:pPr>
+                      <a:r>
+                        <a:rPr lang="en-IN" sz="1800" b="0" i="0" kern="1200" dirty="0" smtClean="0">
+                          <a:solidFill>
+                            <a:schemeClr val="dk1"/>
+                          </a:solidFill>
+                          <a:effectLst/>
+                          <a:latin typeface="+mn-lt"/>
+                          <a:ea typeface="+mn-ea"/>
+                          <a:cs typeface="+mn-cs"/>
+                        </a:rPr>
+                        <a:t>Nov/2006</a:t>
+                      </a:r>
+                      <a:endParaRPr lang="en-US" dirty="0" smtClean="0"/>
+                    </a:p>
+                  </a:txBody>
+                  <a:tcPr/>
+                </a:tc>
+                <a:tc>
+                  <a:txBody>
+                    <a:bodyPr/>
+                    <a:lstStyle/>
+                    <a:p>
+                      <a:pPr marL="0" marR="0" lvl="0" indent="0" algn="l" defTabSz="914400" rtl="0" eaLnBrk="1" fontAlgn="auto" latinLnBrk="0" hangingPunct="1">
+                        <a:lnSpc>
+                          <a:spcPct val="100000"/>
+                        </a:lnSpc>
+                        <a:spcBef>
+                          <a:spcPts val="0"/>
+                        </a:spcBef>
+                        <a:spcAft>
+                          <a:spcPts val="0"/>
+                        </a:spcAft>
+                        <a:buClrTx/>
+                        <a:buSzTx/>
+                        <a:buFontTx/>
+                        <a:buNone/>
+                        <a:tabLst/>
+                        <a:defRPr/>
+                      </a:pPr>
+                      <a:r>
+                        <a:rPr lang="en-US" dirty="0" smtClean="0"/>
+                        <a:t>Windows Desktop</a:t>
+                      </a:r>
+                    </a:p>
+                    <a:p>
+                      <a:pPr marL="0" marR="0" lvl="0" indent="0" algn="l" defTabSz="914400" rtl="0" eaLnBrk="1" fontAlgn="auto" latinLnBrk="0" hangingPunct="1">
+                        <a:lnSpc>
+                          <a:spcPct val="100000"/>
+                        </a:lnSpc>
+                        <a:spcBef>
+                          <a:spcPts val="0"/>
+                        </a:spcBef>
+                        <a:spcAft>
+                          <a:spcPts val="0"/>
+                        </a:spcAft>
+                        <a:buClrTx/>
+                        <a:buSzTx/>
+                        <a:buFontTx/>
+                        <a:buNone/>
+                        <a:tabLst/>
+                        <a:defRPr/>
+                      </a:pPr>
+                      <a:r>
+                        <a:rPr lang="en-US" dirty="0" smtClean="0"/>
+                        <a:t>(.Net Fx 3.x)</a:t>
+                      </a:r>
+                    </a:p>
+                  </a:txBody>
+                  <a:tcPr/>
+                </a:tc>
+                <a:tc>
+                  <a:txBody>
+                    <a:bodyPr/>
+                    <a:lstStyle/>
+                    <a:p>
+                      <a:pPr marL="0" marR="0" lvl="0" indent="0" algn="l" defTabSz="914400" rtl="0" eaLnBrk="1" fontAlgn="auto" latinLnBrk="0" hangingPunct="1">
+                        <a:lnSpc>
+                          <a:spcPct val="100000"/>
+                        </a:lnSpc>
+                        <a:spcBef>
+                          <a:spcPts val="0"/>
+                        </a:spcBef>
+                        <a:spcAft>
+                          <a:spcPts val="0"/>
+                        </a:spcAft>
+                        <a:buClrTx/>
+                        <a:buSzTx/>
+                        <a:buFontTx/>
+                        <a:buNone/>
+                        <a:tabLst/>
+                        <a:defRPr/>
+                      </a:pPr>
+                      <a:r>
+                        <a:rPr lang="en-IN" dirty="0" smtClean="0">
+                          <a:hlinkClick r:id="rId4"/>
+                        </a:rPr>
+                        <a:t>https://github.com/dotnet/wpf</a:t>
+                      </a:r>
+                      <a:endParaRPr lang="en-IN" dirty="0" smtClean="0"/>
+                    </a:p>
+                  </a:txBody>
+                  <a:tcPr/>
+                </a:tc>
+              </a:tr>
+              <a:tr h="566112">
+                <a:tc>
+                  <a:txBody>
+                    <a:bodyPr/>
+                    <a:lstStyle/>
+                    <a:p>
+                      <a:pPr marL="0" marR="0" lvl="0" indent="0" algn="l" defTabSz="914400" rtl="0" eaLnBrk="1" fontAlgn="auto" latinLnBrk="0" hangingPunct="1">
+                        <a:lnSpc>
+                          <a:spcPct val="100000"/>
+                        </a:lnSpc>
+                        <a:spcBef>
+                          <a:spcPts val="0"/>
+                        </a:spcBef>
+                        <a:spcAft>
+                          <a:spcPts val="0"/>
+                        </a:spcAft>
+                        <a:buClrTx/>
+                        <a:buSzTx/>
+                        <a:buFontTx/>
+                        <a:buNone/>
+                        <a:tabLst/>
+                        <a:defRPr/>
+                      </a:pPr>
+                      <a:r>
+                        <a:rPr lang="en-US" dirty="0" smtClean="0"/>
+                        <a:t>WinUI</a:t>
+                      </a:r>
+                    </a:p>
+                    <a:p>
+                      <a:pPr marL="0" marR="0" lvl="0" indent="0" algn="l" defTabSz="914400" rtl="0" eaLnBrk="1" fontAlgn="auto" latinLnBrk="0" hangingPunct="1">
+                        <a:lnSpc>
+                          <a:spcPct val="100000"/>
+                        </a:lnSpc>
+                        <a:spcBef>
+                          <a:spcPts val="0"/>
+                        </a:spcBef>
+                        <a:spcAft>
+                          <a:spcPts val="0"/>
+                        </a:spcAft>
+                        <a:buClrTx/>
+                        <a:buSzTx/>
+                        <a:buFontTx/>
+                        <a:buNone/>
+                        <a:tabLst/>
+                        <a:defRPr/>
+                      </a:pPr>
+                      <a:r>
+                        <a:rPr lang="en-US" dirty="0" smtClean="0"/>
+                        <a:t>Nov/2012</a:t>
+                      </a:r>
+                    </a:p>
+                  </a:txBody>
+                  <a:tcPr/>
+                </a:tc>
+                <a:tc>
+                  <a:txBody>
+                    <a:bodyPr/>
+                    <a:lstStyle/>
+                    <a:p>
+                      <a:pPr marL="0" marR="0" lvl="0" indent="0" algn="l" defTabSz="914400" rtl="0" eaLnBrk="1" fontAlgn="auto" latinLnBrk="0" hangingPunct="1">
+                        <a:lnSpc>
+                          <a:spcPct val="100000"/>
+                        </a:lnSpc>
+                        <a:spcBef>
+                          <a:spcPts val="0"/>
+                        </a:spcBef>
+                        <a:spcAft>
+                          <a:spcPts val="0"/>
+                        </a:spcAft>
+                        <a:buClrTx/>
+                        <a:buSzTx/>
+                        <a:buFontTx/>
+                        <a:buNone/>
+                        <a:tabLst/>
+                        <a:defRPr/>
+                      </a:pPr>
+                      <a:r>
+                        <a:rPr lang="en-US" dirty="0" smtClean="0"/>
+                        <a:t>UWP</a:t>
+                      </a:r>
+                      <a:r>
+                        <a:rPr lang="en-US" baseline="0" dirty="0" smtClean="0"/>
+                        <a:t> (</a:t>
+                      </a:r>
+                      <a:r>
+                        <a:rPr lang="en-US" dirty="0" smtClean="0"/>
+                        <a:t>Desktop,</a:t>
+                      </a:r>
+                      <a:r>
+                        <a:rPr lang="en-US" baseline="0" dirty="0" smtClean="0"/>
+                        <a:t> Mobile, IoT)</a:t>
+                      </a:r>
+                      <a:endParaRPr lang="en-US" dirty="0" smtClean="0"/>
+                    </a:p>
+                    <a:p>
+                      <a:pPr marL="0" marR="0" lvl="0" indent="0" algn="l" defTabSz="914400" rtl="0" eaLnBrk="1" fontAlgn="auto" latinLnBrk="0" hangingPunct="1">
+                        <a:lnSpc>
+                          <a:spcPct val="100000"/>
+                        </a:lnSpc>
+                        <a:spcBef>
+                          <a:spcPts val="0"/>
+                        </a:spcBef>
+                        <a:spcAft>
+                          <a:spcPts val="0"/>
+                        </a:spcAft>
+                        <a:buClrTx/>
+                        <a:buSzTx/>
+                        <a:buFontTx/>
+                        <a:buNone/>
+                        <a:tabLst/>
+                        <a:defRPr/>
+                      </a:pPr>
+                      <a:r>
+                        <a:rPr lang="en-US" dirty="0" smtClean="0"/>
+                        <a:t>(.Net Fx 4.x,</a:t>
+                      </a:r>
+                      <a:r>
+                        <a:rPr lang="en-US" baseline="0" dirty="0" smtClean="0"/>
+                        <a:t> </a:t>
+                      </a:r>
+                      <a:r>
+                        <a:rPr lang="en-US" dirty="0" smtClean="0"/>
+                        <a:t>.Net</a:t>
+                      </a:r>
+                      <a:r>
+                        <a:rPr lang="en-US" baseline="0" dirty="0" smtClean="0"/>
+                        <a:t> Core Fx 3.x)</a:t>
+                      </a:r>
+                      <a:endParaRPr lang="en-US" dirty="0" smtClean="0"/>
+                    </a:p>
+                  </a:txBody>
+                  <a:tcPr/>
+                </a:tc>
+                <a:tc>
+                  <a:txBody>
+                    <a:bodyPr/>
+                    <a:lstStyle/>
+                    <a:p>
+                      <a:pPr marL="0" marR="0" lvl="0" indent="0" algn="l" defTabSz="914400" rtl="0" eaLnBrk="1" fontAlgn="auto" latinLnBrk="0" hangingPunct="1">
+                        <a:lnSpc>
+                          <a:spcPct val="100000"/>
+                        </a:lnSpc>
+                        <a:spcBef>
+                          <a:spcPts val="0"/>
+                        </a:spcBef>
+                        <a:spcAft>
+                          <a:spcPts val="0"/>
+                        </a:spcAft>
+                        <a:buClrTx/>
+                        <a:buSzTx/>
+                        <a:buFontTx/>
+                        <a:buNone/>
+                        <a:tabLst/>
+                        <a:defRPr/>
+                      </a:pPr>
+                      <a:r>
+                        <a:rPr lang="en-IN" dirty="0" smtClean="0">
+                          <a:hlinkClick r:id="rId5"/>
+                        </a:rPr>
+                        <a:t>https://github.com/microsoft/microsoft-ui-xaml</a:t>
+                      </a:r>
+                      <a:endParaRPr lang="en-IN" dirty="0" smtClean="0"/>
+                    </a:p>
+                  </a:txBody>
+                  <a:tcPr/>
+                </a:tc>
+              </a:tr>
+              <a:tr h="808731">
+                <a:tc>
+                  <a:txBody>
+                    <a:bodyPr/>
+                    <a:lstStyle/>
+                    <a:p>
+                      <a:pPr marL="0" marR="0" lvl="0" indent="0" algn="l" defTabSz="914400" rtl="0" eaLnBrk="1" fontAlgn="auto" latinLnBrk="0" hangingPunct="1">
+                        <a:lnSpc>
+                          <a:spcPct val="100000"/>
+                        </a:lnSpc>
+                        <a:spcBef>
+                          <a:spcPts val="0"/>
+                        </a:spcBef>
+                        <a:spcAft>
+                          <a:spcPts val="0"/>
+                        </a:spcAft>
+                        <a:buClrTx/>
+                        <a:buSzTx/>
+                        <a:buFontTx/>
+                        <a:buNone/>
+                        <a:tabLst/>
+                        <a:defRPr/>
+                      </a:pPr>
+                      <a:r>
+                        <a:rPr lang="en-US" dirty="0" smtClean="0"/>
+                        <a:t>MAUI</a:t>
+                      </a:r>
+                    </a:p>
+                    <a:p>
+                      <a:pPr marL="0" marR="0" lvl="0" indent="0" algn="l" defTabSz="914400" rtl="0" eaLnBrk="1" fontAlgn="auto" latinLnBrk="0" hangingPunct="1">
+                        <a:lnSpc>
+                          <a:spcPct val="100000"/>
+                        </a:lnSpc>
+                        <a:spcBef>
+                          <a:spcPts val="0"/>
+                        </a:spcBef>
+                        <a:spcAft>
+                          <a:spcPts val="0"/>
+                        </a:spcAft>
+                        <a:buClrTx/>
+                        <a:buSzTx/>
+                        <a:buFontTx/>
+                        <a:buNone/>
+                        <a:tabLst/>
+                        <a:defRPr/>
+                      </a:pPr>
+                      <a:r>
+                        <a:rPr lang="en-US" dirty="0" smtClean="0"/>
+                        <a:t>May/2014</a:t>
+                      </a:r>
+                    </a:p>
+                  </a:txBody>
+                  <a:tcPr/>
+                </a:tc>
+                <a:tc>
+                  <a:txBody>
+                    <a:bodyPr/>
+                    <a:lstStyle/>
+                    <a:p>
+                      <a:pPr marL="0" marR="0" lvl="0" indent="0" algn="l" defTabSz="914400" rtl="0" eaLnBrk="1" fontAlgn="auto" latinLnBrk="0" hangingPunct="1">
+                        <a:lnSpc>
+                          <a:spcPct val="100000"/>
+                        </a:lnSpc>
+                        <a:spcBef>
+                          <a:spcPts val="0"/>
+                        </a:spcBef>
+                        <a:spcAft>
+                          <a:spcPts val="0"/>
+                        </a:spcAft>
+                        <a:buClrTx/>
+                        <a:buSzTx/>
+                        <a:buFontTx/>
+                        <a:buNone/>
+                        <a:tabLst/>
+                        <a:defRPr/>
+                      </a:pPr>
+                      <a:r>
+                        <a:rPr lang="en-US" dirty="0" smtClean="0"/>
+                        <a:t>Desktop</a:t>
+                      </a:r>
+                      <a:r>
+                        <a:rPr lang="en-US" baseline="0" dirty="0" smtClean="0"/>
+                        <a:t> &amp; Mobile (Windows, Android, iOS)</a:t>
+                      </a:r>
+                      <a:endParaRPr lang="en-US" dirty="0" smtClean="0"/>
+                    </a:p>
+                    <a:p>
+                      <a:pPr marL="0" marR="0" lvl="0" indent="0" algn="l" defTabSz="914400" rtl="0" eaLnBrk="1" fontAlgn="auto" latinLnBrk="0" hangingPunct="1">
+                        <a:lnSpc>
+                          <a:spcPct val="100000"/>
+                        </a:lnSpc>
+                        <a:spcBef>
+                          <a:spcPts val="0"/>
+                        </a:spcBef>
+                        <a:spcAft>
+                          <a:spcPts val="0"/>
+                        </a:spcAft>
+                        <a:buClrTx/>
+                        <a:buSzTx/>
+                        <a:buFontTx/>
+                        <a:buNone/>
+                        <a:tabLst/>
+                        <a:defRPr/>
+                      </a:pPr>
+                      <a:r>
+                        <a:rPr lang="en-US" dirty="0" smtClean="0"/>
+                        <a:t>(.Net Core Fx 6.x)</a:t>
+                      </a:r>
+                    </a:p>
+                  </a:txBody>
+                  <a:tcPr/>
+                </a:tc>
+                <a:tc>
+                  <a:txBody>
+                    <a:bodyPr/>
+                    <a:lstStyle/>
+                    <a:p>
+                      <a:pPr marL="0" marR="0" lvl="0" indent="0" algn="l" defTabSz="914400" rtl="0" eaLnBrk="1" fontAlgn="auto" latinLnBrk="0" hangingPunct="1">
+                        <a:lnSpc>
+                          <a:spcPct val="100000"/>
+                        </a:lnSpc>
+                        <a:spcBef>
+                          <a:spcPts val="0"/>
+                        </a:spcBef>
+                        <a:spcAft>
+                          <a:spcPts val="0"/>
+                        </a:spcAft>
+                        <a:buClrTx/>
+                        <a:buSzTx/>
+                        <a:buFontTx/>
+                        <a:buNone/>
+                        <a:tabLst/>
+                        <a:defRPr/>
+                      </a:pPr>
+                      <a:r>
+                        <a:rPr lang="en-IN" dirty="0" smtClean="0">
+                          <a:hlinkClick r:id="rId6"/>
+                        </a:rPr>
+                        <a:t>https://github.com/dotnet/maui</a:t>
+                      </a:r>
+                      <a:endParaRPr lang="en-IN" dirty="0" smtClean="0"/>
+                    </a:p>
+                  </a:txBody>
+                  <a:tcPr/>
+                </a:tc>
+              </a:tr>
+              <a:tr h="389993">
+                <a:tc>
+                  <a:txBody>
+                    <a:bodyPr/>
+                    <a:lstStyle/>
+                    <a:p>
+                      <a:pPr marL="0" marR="0" lvl="0" indent="0" algn="l" defTabSz="914400" rtl="0" eaLnBrk="1" fontAlgn="auto" latinLnBrk="0" hangingPunct="1">
+                        <a:lnSpc>
+                          <a:spcPct val="100000"/>
+                        </a:lnSpc>
+                        <a:spcBef>
+                          <a:spcPts val="0"/>
+                        </a:spcBef>
+                        <a:spcAft>
+                          <a:spcPts val="0"/>
+                        </a:spcAft>
+                        <a:buClrTx/>
+                        <a:buSzTx/>
+                        <a:buFontTx/>
+                        <a:buNone/>
+                        <a:tabLst/>
+                        <a:defRPr/>
+                      </a:pPr>
+                      <a:r>
+                        <a:rPr lang="en-US" dirty="0" smtClean="0"/>
+                        <a:t>EF Core</a:t>
+                      </a:r>
+                    </a:p>
+                  </a:txBody>
+                  <a:tcPr/>
+                </a:tc>
+                <a:tc>
+                  <a:txBody>
+                    <a:bodyPr/>
+                    <a:lstStyle/>
+                    <a:p>
+                      <a:pPr marL="0" marR="0" lvl="0" indent="0" algn="l" defTabSz="914400" rtl="0" eaLnBrk="1" fontAlgn="auto" latinLnBrk="0" hangingPunct="1">
+                        <a:lnSpc>
+                          <a:spcPct val="100000"/>
+                        </a:lnSpc>
+                        <a:spcBef>
+                          <a:spcPts val="0"/>
+                        </a:spcBef>
+                        <a:spcAft>
+                          <a:spcPts val="0"/>
+                        </a:spcAft>
+                        <a:buClrTx/>
+                        <a:buSzTx/>
+                        <a:buFontTx/>
+                        <a:buNone/>
+                        <a:tabLst/>
+                        <a:defRPr/>
+                      </a:pPr>
+                      <a:r>
+                        <a:rPr lang="en-US" dirty="0" smtClean="0"/>
+                        <a:t>Windows, Linux, macOS</a:t>
+                      </a:r>
+                    </a:p>
+                  </a:txBody>
+                  <a:tcPr/>
+                </a:tc>
+                <a:tc>
+                  <a:txBody>
+                    <a:bodyPr/>
+                    <a:lstStyle/>
+                    <a:p>
+                      <a:pPr marL="0" marR="0" lvl="0" indent="0" algn="l" defTabSz="914400" rtl="0" eaLnBrk="1" fontAlgn="auto" latinLnBrk="0" hangingPunct="1">
+                        <a:lnSpc>
+                          <a:spcPct val="100000"/>
+                        </a:lnSpc>
+                        <a:spcBef>
+                          <a:spcPts val="0"/>
+                        </a:spcBef>
+                        <a:spcAft>
+                          <a:spcPts val="0"/>
+                        </a:spcAft>
+                        <a:buClrTx/>
+                        <a:buSzTx/>
+                        <a:buFontTx/>
+                        <a:buNone/>
+                        <a:tabLst/>
+                        <a:defRPr/>
+                      </a:pPr>
+                      <a:r>
+                        <a:rPr lang="en-IN" dirty="0" smtClean="0">
+                          <a:hlinkClick r:id="rId7"/>
+                        </a:rPr>
+                        <a:t>https://github.com/dotnet/efcore</a:t>
+                      </a:r>
+                      <a:endParaRPr lang="en-IN" dirty="0" smtClean="0"/>
+                    </a:p>
+                  </a:txBody>
+                  <a:tcPr/>
+                </a:tc>
+              </a:tr>
+              <a:tr h="566112">
+                <a:tc>
+                  <a:txBody>
+                    <a:bodyPr/>
+                    <a:lstStyle/>
+                    <a:p>
+                      <a:pPr marL="0" marR="0" lvl="0" indent="0" algn="l" defTabSz="914400" rtl="0" eaLnBrk="1" fontAlgn="auto" latinLnBrk="0" hangingPunct="1">
+                        <a:lnSpc>
+                          <a:spcPct val="100000"/>
+                        </a:lnSpc>
+                        <a:spcBef>
+                          <a:spcPts val="0"/>
+                        </a:spcBef>
+                        <a:spcAft>
+                          <a:spcPts val="0"/>
+                        </a:spcAft>
+                        <a:buClrTx/>
+                        <a:buSzTx/>
+                        <a:buFontTx/>
+                        <a:buNone/>
+                        <a:tabLst/>
+                        <a:defRPr/>
+                      </a:pPr>
+                      <a:r>
+                        <a:rPr lang="en-US" dirty="0" smtClean="0"/>
+                        <a:t>ASP.Net Core</a:t>
+                      </a:r>
+                    </a:p>
+                  </a:txBody>
+                  <a:tcPr/>
+                </a:tc>
+                <a:tc>
+                  <a:txBody>
+                    <a:bodyPr/>
+                    <a:lstStyle/>
+                    <a:p>
+                      <a:pPr marL="0" marR="0" lvl="0" indent="0" algn="l" defTabSz="914400" rtl="0" eaLnBrk="1" fontAlgn="auto" latinLnBrk="0" hangingPunct="1">
+                        <a:lnSpc>
+                          <a:spcPct val="100000"/>
+                        </a:lnSpc>
+                        <a:spcBef>
+                          <a:spcPts val="0"/>
+                        </a:spcBef>
+                        <a:spcAft>
+                          <a:spcPts val="0"/>
+                        </a:spcAft>
+                        <a:buClrTx/>
+                        <a:buSzTx/>
+                        <a:buFontTx/>
+                        <a:buNone/>
+                        <a:tabLst/>
+                        <a:defRPr/>
+                      </a:pPr>
+                      <a:r>
+                        <a:rPr lang="en-US" dirty="0" smtClean="0"/>
+                        <a:t>Windows, Linux, macOS</a:t>
+                      </a:r>
+                    </a:p>
+                  </a:txBody>
+                  <a:tcPr/>
+                </a:tc>
+                <a:tc>
+                  <a:txBody>
+                    <a:bodyPr/>
+                    <a:lstStyle/>
+                    <a:p>
+                      <a:pPr marL="0" marR="0" lvl="0" indent="0" algn="l" defTabSz="914400" rtl="0" eaLnBrk="1" fontAlgn="auto" latinLnBrk="0" hangingPunct="1">
+                        <a:lnSpc>
+                          <a:spcPct val="100000"/>
+                        </a:lnSpc>
+                        <a:spcBef>
+                          <a:spcPts val="0"/>
+                        </a:spcBef>
+                        <a:spcAft>
+                          <a:spcPts val="0"/>
+                        </a:spcAft>
+                        <a:buClrTx/>
+                        <a:buSzTx/>
+                        <a:buFontTx/>
+                        <a:buNone/>
+                        <a:tabLst/>
+                        <a:defRPr/>
+                      </a:pPr>
+                      <a:r>
+                        <a:rPr lang="en-IN" dirty="0" smtClean="0">
+                          <a:hlinkClick r:id="rId8"/>
+                        </a:rPr>
+                        <a:t>https://github.com/dotnet/aspnetcore</a:t>
+                      </a:r>
+                      <a:r>
+                        <a:rPr lang="en-IN" dirty="0" smtClean="0"/>
+                        <a:t> </a:t>
+                      </a:r>
+                    </a:p>
+                    <a:p>
+                      <a:endParaRPr lang="en-IN" dirty="0"/>
+                    </a:p>
+                  </a:txBody>
+                  <a:tcPr/>
+                </a:tc>
+              </a:tr>
+            </a:tbl>
+          </a:graphicData>
+        </a:graphic>
+      </p:graphicFrame>
     </p:spTree>
     <p:extLst>
       <p:ext uri="{BB962C8B-B14F-4D97-AF65-F5344CB8AC3E}">
-        <p14:creationId xmlns:p14="http://schemas.microsoft.com/office/powerpoint/2010/main" val="1331523465"/>
+        <p14:creationId xmlns:p14="http://schemas.microsoft.com/office/powerpoint/2010/main" val="3032068795"/>
       </p:ext>
     </p:extLst>
   </p:cSld>

</xml_diff>